<commit_message>
Updating powerpoint template for everyone to add their sections to
</commit_message>
<xml_diff>
--- a/CapstoneAssignments/CapstoneProposal.pptx
+++ b/CapstoneAssignments/CapstoneProposal.pptx
@@ -8,6 +8,10 @@
     <p:sldId id="256" r:id="rId2"/>
     <p:sldId id="257" r:id="rId3"/>
     <p:sldId id="258" r:id="rId4"/>
+    <p:sldId id="259" r:id="rId5"/>
+    <p:sldId id="260" r:id="rId6"/>
+    <p:sldId id="261" r:id="rId7"/>
+    <p:sldId id="262" r:id="rId8"/>
   </p:sldIdLst>
   <p:sldSz cx="9144000" cy="6858000" type="screen4x3"/>
   <p:notesSz cx="6858000" cy="9144000"/>
@@ -4073,7 +4077,9 @@
         </p:nvSpPr>
         <p:spPr/>
         <p:txBody>
-          <a:bodyPr/>
+          <a:bodyPr>
+            <a:normAutofit fontScale="92500"/>
+          </a:bodyPr>
           <a:lstStyle/>
           <a:p>
             <a:r>
@@ -4097,29 +4103,41 @@
           <a:p>
             <a:r>
               <a:rPr lang="en-US" dirty="0" smtClean="0"/>
-              <a:t>Reasonable power consumption</a:t>
-            </a:r>
-          </a:p>
-          <a:p>
-            <a:pPr lvl="1"/>
+              <a:t>Capable of complex user selectable recording schedule</a:t>
+            </a:r>
+          </a:p>
+          <a:p>
             <a:r>
               <a:rPr lang="en-US" dirty="0" smtClean="0"/>
-              <a:t>4 days of continuous recording</a:t>
-            </a:r>
-          </a:p>
-          <a:p>
-            <a:pPr lvl="1"/>
+              <a:t>Recordings must be downloadable to laptop</a:t>
+            </a:r>
+          </a:p>
+          <a:p>
             <a:r>
               <a:rPr lang="en-US" dirty="0" smtClean="0"/>
-              <a:t>30 days of </a:t>
-            </a:r>
-            <a:r>
-              <a:rPr lang="en-US" smtClean="0"/>
-              <a:t>sleep mode</a:t>
-            </a:r>
-          </a:p>
-          <a:p>
-            <a:endParaRPr lang="en-US" smtClean="0"/>
+              <a:t>Time stamps must be synchronized between recording device and GUI on laptop</a:t>
+            </a:r>
+          </a:p>
+          <a:p>
+            <a:r>
+              <a:rPr lang="en-US" dirty="0" smtClean="0"/>
+              <a:t>Must be able to modify sample rate</a:t>
+            </a:r>
+          </a:p>
+          <a:p>
+            <a:r>
+              <a:rPr lang="en-US" dirty="0" smtClean="0"/>
+              <a:t>Must be able to hear and/or display recordings (spectrogram)</a:t>
+            </a:r>
+          </a:p>
+          <a:p>
+            <a:endParaRPr lang="en-US" dirty="0" smtClean="0"/>
+          </a:p>
+          <a:p>
+            <a:endParaRPr lang="en-US" dirty="0" smtClean="0"/>
+          </a:p>
+          <a:p>
+            <a:endParaRPr lang="en-US" dirty="0" smtClean="0"/>
           </a:p>
           <a:p>
             <a:endParaRPr lang="en-US" dirty="0" smtClean="0"/>
@@ -4129,6 +4147,324 @@
               <a:buNone/>
             </a:pPr>
             <a:endParaRPr lang="en-US" dirty="0" smtClean="0"/>
+          </a:p>
+        </p:txBody>
+      </p:sp>
+    </p:spTree>
+  </p:cSld>
+  <p:clrMapOvr>
+    <a:masterClrMapping/>
+  </p:clrMapOvr>
+</p:sld>
+</file>
+
+<file path=ppt/slides/slide4.xml><?xml version="1.0" encoding="utf-8"?>
+<p:sld xmlns:a="http://schemas.openxmlformats.org/drawingml/2006/main" xmlns:r="http://schemas.openxmlformats.org/officeDocument/2006/relationships" xmlns:mc="http://schemas.openxmlformats.org/markup-compatibility/2006" xmlns:mv="urn:schemas-microsoft-com:mac:vml" xmlns:p="http://schemas.openxmlformats.org/presentationml/2006/main" mc:Ignorable="mv" mc:PreserveAttributes="mv:*">
+  <p:cSld>
+    <p:spTree>
+      <p:nvGrpSpPr>
+        <p:cNvPr id="1" name=""/>
+        <p:cNvGrpSpPr/>
+        <p:nvPr/>
+      </p:nvGrpSpPr>
+      <p:grpSpPr>
+        <a:xfrm>
+          <a:off x="0" y="0"/>
+          <a:ext cx="0" cy="0"/>
+          <a:chOff x="0" y="0"/>
+          <a:chExt cx="0" cy="0"/>
+        </a:xfrm>
+      </p:grpSpPr>
+      <p:sp>
+        <p:nvSpPr>
+          <p:cNvPr id="2" name="Title 1"/>
+          <p:cNvSpPr>
+            <a:spLocks noGrp="1"/>
+          </p:cNvSpPr>
+          <p:nvPr>
+            <p:ph type="title"/>
+          </p:nvPr>
+        </p:nvSpPr>
+        <p:spPr/>
+        <p:txBody>
+          <a:bodyPr/>
+          <a:lstStyle/>
+          <a:p>
+            <a:r>
+              <a:rPr lang="en-US" dirty="0" smtClean="0"/>
+              <a:t>Feature Goals (Cont.)</a:t>
+            </a:r>
+            <a:endParaRPr lang="en-US" dirty="0"/>
+          </a:p>
+        </p:txBody>
+      </p:sp>
+      <p:sp>
+        <p:nvSpPr>
+          <p:cNvPr id="3" name="Content Placeholder 2"/>
+          <p:cNvSpPr>
+            <a:spLocks noGrp="1"/>
+          </p:cNvSpPr>
+          <p:nvPr>
+            <p:ph idx="1"/>
+          </p:nvPr>
+        </p:nvSpPr>
+        <p:spPr/>
+        <p:txBody>
+          <a:bodyPr/>
+          <a:lstStyle/>
+          <a:p>
+            <a:r>
+              <a:rPr lang="en-US" dirty="0" smtClean="0"/>
+              <a:t>Reasonable power consumption (alkaline batteries)</a:t>
+            </a:r>
+          </a:p>
+          <a:p>
+            <a:pPr lvl="1"/>
+            <a:r>
+              <a:rPr lang="en-US" dirty="0" smtClean="0"/>
+              <a:t>4 days of continuous recording</a:t>
+            </a:r>
+          </a:p>
+          <a:p>
+            <a:pPr lvl="1"/>
+            <a:r>
+              <a:rPr lang="en-US" dirty="0" smtClean="0"/>
+              <a:t>30 days of sleep mode</a:t>
+            </a:r>
+          </a:p>
+          <a:p>
+            <a:pPr lvl="1"/>
+            <a:r>
+              <a:rPr lang="en-US" dirty="0" smtClean="0"/>
+              <a:t>Must create battery </a:t>
+            </a:r>
+            <a:r>
+              <a:rPr lang="en-US" dirty="0" smtClean="0"/>
+              <a:t>harness</a:t>
+            </a:r>
+          </a:p>
+          <a:p>
+            <a:r>
+              <a:rPr lang="en-US" dirty="0" smtClean="0"/>
+              <a:t>Must develop hardware brackets to mount device in glider</a:t>
+            </a:r>
+          </a:p>
+          <a:p>
+            <a:pPr lvl="1"/>
+            <a:r>
+              <a:rPr lang="en-US" dirty="0" smtClean="0"/>
+              <a:t>This depends on space available in glider</a:t>
+            </a:r>
+          </a:p>
+          <a:p>
+            <a:r>
+              <a:rPr lang="en-US" dirty="0" smtClean="0"/>
+              <a:t>Completed device must weigh less than 0.5 kg</a:t>
+            </a:r>
+          </a:p>
+          <a:p>
+            <a:endParaRPr lang="en-US" dirty="0" smtClean="0"/>
+          </a:p>
+        </p:txBody>
+      </p:sp>
+    </p:spTree>
+  </p:cSld>
+  <p:clrMapOvr>
+    <a:masterClrMapping/>
+  </p:clrMapOvr>
+</p:sld>
+</file>
+
+<file path=ppt/slides/slide5.xml><?xml version="1.0" encoding="utf-8"?>
+<p:sld xmlns:a="http://schemas.openxmlformats.org/drawingml/2006/main" xmlns:r="http://schemas.openxmlformats.org/officeDocument/2006/relationships" xmlns:mc="http://schemas.openxmlformats.org/markup-compatibility/2006" xmlns:mv="urn:schemas-microsoft-com:mac:vml" xmlns:p="http://schemas.openxmlformats.org/presentationml/2006/main" mc:Ignorable="mv" mc:PreserveAttributes="mv:*">
+  <p:cSld>
+    <p:spTree>
+      <p:nvGrpSpPr>
+        <p:cNvPr id="1" name=""/>
+        <p:cNvGrpSpPr/>
+        <p:nvPr/>
+      </p:nvGrpSpPr>
+      <p:grpSpPr>
+        <a:xfrm>
+          <a:off x="0" y="0"/>
+          <a:ext cx="0" cy="0"/>
+          <a:chOff x="0" y="0"/>
+          <a:chExt cx="0" cy="0"/>
+        </a:xfrm>
+      </p:grpSpPr>
+      <p:sp>
+        <p:nvSpPr>
+          <p:cNvPr id="2" name="Title 1"/>
+          <p:cNvSpPr>
+            <a:spLocks noGrp="1"/>
+          </p:cNvSpPr>
+          <p:nvPr>
+            <p:ph type="title"/>
+          </p:nvPr>
+        </p:nvSpPr>
+        <p:spPr/>
+        <p:txBody>
+          <a:bodyPr/>
+          <a:lstStyle/>
+          <a:p>
+            <a:r>
+              <a:rPr lang="en-US" dirty="0" smtClean="0"/>
+              <a:t>Hardware</a:t>
+            </a:r>
+            <a:endParaRPr lang="en-US" dirty="0"/>
+          </a:p>
+        </p:txBody>
+      </p:sp>
+      <p:sp>
+        <p:nvSpPr>
+          <p:cNvPr id="3" name="Content Placeholder 2"/>
+          <p:cNvSpPr>
+            <a:spLocks noGrp="1"/>
+          </p:cNvSpPr>
+          <p:nvPr>
+            <p:ph idx="1"/>
+          </p:nvPr>
+        </p:nvSpPr>
+        <p:spPr/>
+        <p:txBody>
+          <a:bodyPr/>
+          <a:lstStyle/>
+          <a:p>
+            <a:endParaRPr lang="en-US"/>
+          </a:p>
+        </p:txBody>
+      </p:sp>
+    </p:spTree>
+  </p:cSld>
+  <p:clrMapOvr>
+    <a:masterClrMapping/>
+  </p:clrMapOvr>
+</p:sld>
+</file>
+
+<file path=ppt/slides/slide6.xml><?xml version="1.0" encoding="utf-8"?>
+<p:sld xmlns:a="http://schemas.openxmlformats.org/drawingml/2006/main" xmlns:r="http://schemas.openxmlformats.org/officeDocument/2006/relationships" xmlns:mc="http://schemas.openxmlformats.org/markup-compatibility/2006" xmlns:mv="urn:schemas-microsoft-com:mac:vml" xmlns:p="http://schemas.openxmlformats.org/presentationml/2006/main" mc:Ignorable="mv" mc:PreserveAttributes="mv:*">
+  <p:cSld>
+    <p:spTree>
+      <p:nvGrpSpPr>
+        <p:cNvPr id="1" name=""/>
+        <p:cNvGrpSpPr/>
+        <p:nvPr/>
+      </p:nvGrpSpPr>
+      <p:grpSpPr>
+        <a:xfrm>
+          <a:off x="0" y="0"/>
+          <a:ext cx="0" cy="0"/>
+          <a:chOff x="0" y="0"/>
+          <a:chExt cx="0" cy="0"/>
+        </a:xfrm>
+      </p:grpSpPr>
+      <p:sp>
+        <p:nvSpPr>
+          <p:cNvPr id="2" name="Title 1"/>
+          <p:cNvSpPr>
+            <a:spLocks noGrp="1"/>
+          </p:cNvSpPr>
+          <p:nvPr>
+            <p:ph type="title"/>
+          </p:nvPr>
+        </p:nvSpPr>
+        <p:spPr/>
+        <p:txBody>
+          <a:bodyPr/>
+          <a:lstStyle/>
+          <a:p>
+            <a:r>
+              <a:rPr lang="en-US" dirty="0" smtClean="0"/>
+              <a:t>Software</a:t>
+            </a:r>
+            <a:endParaRPr lang="en-US" dirty="0"/>
+          </a:p>
+        </p:txBody>
+      </p:sp>
+      <p:sp>
+        <p:nvSpPr>
+          <p:cNvPr id="3" name="Content Placeholder 2"/>
+          <p:cNvSpPr>
+            <a:spLocks noGrp="1"/>
+          </p:cNvSpPr>
+          <p:nvPr>
+            <p:ph idx="1"/>
+          </p:nvPr>
+        </p:nvSpPr>
+        <p:spPr/>
+        <p:txBody>
+          <a:bodyPr/>
+          <a:lstStyle/>
+          <a:p>
+            <a:endParaRPr lang="en-US"/>
+          </a:p>
+        </p:txBody>
+      </p:sp>
+    </p:spTree>
+  </p:cSld>
+  <p:clrMapOvr>
+    <a:masterClrMapping/>
+  </p:clrMapOvr>
+</p:sld>
+</file>
+
+<file path=ppt/slides/slide7.xml><?xml version="1.0" encoding="utf-8"?>
+<p:sld xmlns:a="http://schemas.openxmlformats.org/drawingml/2006/main" xmlns:r="http://schemas.openxmlformats.org/officeDocument/2006/relationships" xmlns:mc="http://schemas.openxmlformats.org/markup-compatibility/2006" xmlns:mv="urn:schemas-microsoft-com:mac:vml" xmlns:p="http://schemas.openxmlformats.org/presentationml/2006/main" mc:Ignorable="mv" mc:PreserveAttributes="mv:*">
+  <p:cSld>
+    <p:spTree>
+      <p:nvGrpSpPr>
+        <p:cNvPr id="1" name=""/>
+        <p:cNvGrpSpPr/>
+        <p:nvPr/>
+      </p:nvGrpSpPr>
+      <p:grpSpPr>
+        <a:xfrm>
+          <a:off x="0" y="0"/>
+          <a:ext cx="0" cy="0"/>
+          <a:chOff x="0" y="0"/>
+          <a:chExt cx="0" cy="0"/>
+        </a:xfrm>
+      </p:grpSpPr>
+      <p:sp>
+        <p:nvSpPr>
+          <p:cNvPr id="2" name="Title 1"/>
+          <p:cNvSpPr>
+            <a:spLocks noGrp="1"/>
+          </p:cNvSpPr>
+          <p:nvPr>
+            <p:ph type="title"/>
+          </p:nvPr>
+        </p:nvSpPr>
+        <p:spPr/>
+        <p:txBody>
+          <a:bodyPr/>
+          <a:lstStyle/>
+          <a:p>
+            <a:r>
+              <a:rPr lang="en-US" dirty="0" smtClean="0"/>
+              <a:t>Schedule</a:t>
+            </a:r>
+            <a:endParaRPr lang="en-US" dirty="0"/>
+          </a:p>
+        </p:txBody>
+      </p:sp>
+      <p:sp>
+        <p:nvSpPr>
+          <p:cNvPr id="3" name="Content Placeholder 2"/>
+          <p:cNvSpPr>
+            <a:spLocks noGrp="1"/>
+          </p:cNvSpPr>
+          <p:nvPr>
+            <p:ph idx="1"/>
+          </p:nvPr>
+        </p:nvSpPr>
+        <p:spPr/>
+        <p:txBody>
+          <a:bodyPr/>
+          <a:lstStyle/>
+          <a:p>
+            <a:endParaRPr lang="en-US"/>
           </a:p>
         </p:txBody>
       </p:sp>

</xml_diff>

<commit_message>
Added Phu's slides to pp
</commit_message>
<xml_diff>
--- a/CapstoneAssignments/CapstoneProposal.pptx
+++ b/CapstoneAssignments/CapstoneProposal.pptx
@@ -11,7 +11,8 @@
     <p:sldId id="259" r:id="rId5"/>
     <p:sldId id="260" r:id="rId6"/>
     <p:sldId id="261" r:id="rId7"/>
-    <p:sldId id="262" r:id="rId8"/>
+    <p:sldId id="263" r:id="rId8"/>
+    <p:sldId id="262" r:id="rId9"/>
   </p:sldIdLst>
   <p:sldSz cx="9144000" cy="6858000" type="screen4x3"/>
   <p:notesSz cx="6858000" cy="9144000"/>
@@ -110,6 +111,22 @@
       </a:defRPr>
     </a:lvl9pPr>
   </p:defaultTextStyle>
+  <p:extLst>
+    <p:ext uri="{EFAFB233-063F-42B5-8137-9DF3F51BA10A}">
+      <p15:sldGuideLst xmlns:p15="http://schemas.microsoft.com/office/powerpoint/2012/main" xmlns:p="http://schemas.openxmlformats.org/presentationml/2006/main" xmlns:r="http://schemas.openxmlformats.org/officeDocument/2006/relationships" xmlns:a="http://schemas.openxmlformats.org/drawingml/2006/main" xmlns="">
+        <p15:guide id="1" orient="horz" pos="2160">
+          <p15:clr>
+            <a:srgbClr val="A4A3A4"/>
+          </p15:clr>
+        </p15:guide>
+        <p15:guide id="2" pos="2880">
+          <p15:clr>
+            <a:srgbClr val="A4A3A4"/>
+          </p15:clr>
+        </p15:guide>
+      </p15:sldGuideLst>
+    </p:ext>
+  </p:extLst>
 </p:presentation>
 </file>
 
@@ -286,7 +303,8 @@
           <a:p>
             <a:fld id="{CDF17EBE-DCEA-5640-B5EF-B0CBFC45875D}" type="datetimeFigureOut">
               <a:rPr lang="en-US" smtClean="0"/>
-              <a:t>1/22/15</a:t>
+              <a:pPr/>
+              <a:t>1/23/15</a:t>
             </a:fld>
             <a:endParaRPr lang="en-US"/>
           </a:p>
@@ -452,7 +470,8 @@
           <a:p>
             <a:fld id="{CDF17EBE-DCEA-5640-B5EF-B0CBFC45875D}" type="datetimeFigureOut">
               <a:rPr lang="en-US" smtClean="0"/>
-              <a:t>1/22/15</a:t>
+              <a:pPr/>
+              <a:t>1/23/15</a:t>
             </a:fld>
             <a:endParaRPr lang="en-US"/>
           </a:p>
@@ -494,6 +513,7 @@
           <a:p>
             <a:fld id="{EA9BA1ED-F0E7-DD4C-B400-D6DEFA0D5747}" type="slidenum">
               <a:rPr lang="en-US" smtClean="0"/>
+              <a:pPr/>
               <a:t>‹#›</a:t>
             </a:fld>
             <a:endParaRPr lang="en-US"/>
@@ -627,7 +647,8 @@
           <a:p>
             <a:fld id="{CDF17EBE-DCEA-5640-B5EF-B0CBFC45875D}" type="datetimeFigureOut">
               <a:rPr lang="en-US" smtClean="0"/>
-              <a:t>1/22/15</a:t>
+              <a:pPr/>
+              <a:t>1/23/15</a:t>
             </a:fld>
             <a:endParaRPr lang="en-US"/>
           </a:p>
@@ -669,6 +690,7 @@
           <a:p>
             <a:fld id="{EA9BA1ED-F0E7-DD4C-B400-D6DEFA0D5747}" type="slidenum">
               <a:rPr lang="en-US" smtClean="0"/>
+              <a:pPr/>
               <a:t>‹#›</a:t>
             </a:fld>
             <a:endParaRPr lang="en-US"/>
@@ -792,7 +814,8 @@
           <a:p>
             <a:fld id="{CDF17EBE-DCEA-5640-B5EF-B0CBFC45875D}" type="datetimeFigureOut">
               <a:rPr lang="en-US" smtClean="0"/>
-              <a:t>1/22/15</a:t>
+              <a:pPr/>
+              <a:t>1/23/15</a:t>
             </a:fld>
             <a:endParaRPr lang="en-US"/>
           </a:p>
@@ -834,6 +857,7 @@
           <a:p>
             <a:fld id="{EA9BA1ED-F0E7-DD4C-B400-D6DEFA0D5747}" type="slidenum">
               <a:rPr lang="en-US" smtClean="0"/>
+              <a:pPr/>
               <a:t>‹#›</a:t>
             </a:fld>
             <a:endParaRPr lang="en-US"/>
@@ -1034,7 +1058,8 @@
           <a:p>
             <a:fld id="{CDF17EBE-DCEA-5640-B5EF-B0CBFC45875D}" type="datetimeFigureOut">
               <a:rPr lang="en-US" smtClean="0"/>
-              <a:t>1/22/15</a:t>
+              <a:pPr/>
+              <a:t>1/23/15</a:t>
             </a:fld>
             <a:endParaRPr lang="en-US"/>
           </a:p>
@@ -1076,6 +1101,7 @@
           <a:p>
             <a:fld id="{EA9BA1ED-F0E7-DD4C-B400-D6DEFA0D5747}" type="slidenum">
               <a:rPr lang="en-US" smtClean="0"/>
+              <a:pPr/>
               <a:t>‹#›</a:t>
             </a:fld>
             <a:endParaRPr lang="en-US"/>
@@ -1298,7 +1324,8 @@
           <a:p>
             <a:fld id="{CDF17EBE-DCEA-5640-B5EF-B0CBFC45875D}" type="datetimeFigureOut">
               <a:rPr lang="en-US" smtClean="0"/>
-              <a:t>1/22/15</a:t>
+              <a:pPr/>
+              <a:t>1/23/15</a:t>
             </a:fld>
             <a:endParaRPr lang="en-US"/>
           </a:p>
@@ -1340,6 +1367,7 @@
           <a:p>
             <a:fld id="{EA9BA1ED-F0E7-DD4C-B400-D6DEFA0D5747}" type="slidenum">
               <a:rPr lang="en-US" smtClean="0"/>
+              <a:pPr/>
               <a:t>‹#›</a:t>
             </a:fld>
             <a:endParaRPr lang="en-US"/>
@@ -1676,7 +1704,8 @@
           <a:p>
             <a:fld id="{CDF17EBE-DCEA-5640-B5EF-B0CBFC45875D}" type="datetimeFigureOut">
               <a:rPr lang="en-US" smtClean="0"/>
-              <a:t>1/22/15</a:t>
+              <a:pPr/>
+              <a:t>1/23/15</a:t>
             </a:fld>
             <a:endParaRPr lang="en-US"/>
           </a:p>
@@ -1718,6 +1747,7 @@
           <a:p>
             <a:fld id="{EA9BA1ED-F0E7-DD4C-B400-D6DEFA0D5747}" type="slidenum">
               <a:rPr lang="en-US" smtClean="0"/>
+              <a:pPr/>
               <a:t>‹#›</a:t>
             </a:fld>
             <a:endParaRPr lang="en-US"/>
@@ -1826,7 +1856,8 @@
           <a:p>
             <a:fld id="{CDF17EBE-DCEA-5640-B5EF-B0CBFC45875D}" type="datetimeFigureOut">
               <a:rPr lang="en-US" smtClean="0"/>
-              <a:t>1/22/15</a:t>
+              <a:pPr/>
+              <a:t>1/23/15</a:t>
             </a:fld>
             <a:endParaRPr lang="en-US"/>
           </a:p>
@@ -1868,6 +1899,7 @@
           <a:p>
             <a:fld id="{EA9BA1ED-F0E7-DD4C-B400-D6DEFA0D5747}" type="slidenum">
               <a:rPr lang="en-US" smtClean="0"/>
+              <a:pPr/>
               <a:t>‹#›</a:t>
             </a:fld>
             <a:endParaRPr lang="en-US"/>
@@ -1916,7 +1948,8 @@
           <a:p>
             <a:fld id="{CDF17EBE-DCEA-5640-B5EF-B0CBFC45875D}" type="datetimeFigureOut">
               <a:rPr lang="en-US" smtClean="0"/>
-              <a:t>1/22/15</a:t>
+              <a:pPr/>
+              <a:t>1/23/15</a:t>
             </a:fld>
             <a:endParaRPr lang="en-US"/>
           </a:p>
@@ -1958,6 +1991,7 @@
           <a:p>
             <a:fld id="{EA9BA1ED-F0E7-DD4C-B400-D6DEFA0D5747}" type="slidenum">
               <a:rPr lang="en-US" smtClean="0"/>
+              <a:pPr/>
               <a:t>‹#›</a:t>
             </a:fld>
             <a:endParaRPr lang="en-US"/>
@@ -2177,7 +2211,8 @@
           <a:p>
             <a:fld id="{CDF17EBE-DCEA-5640-B5EF-B0CBFC45875D}" type="datetimeFigureOut">
               <a:rPr lang="en-US" smtClean="0"/>
-              <a:t>1/22/15</a:t>
+              <a:pPr/>
+              <a:t>1/23/15</a:t>
             </a:fld>
             <a:endParaRPr lang="en-US"/>
           </a:p>
@@ -2219,6 +2254,7 @@
           <a:p>
             <a:fld id="{EA9BA1ED-F0E7-DD4C-B400-D6DEFA0D5747}" type="slidenum">
               <a:rPr lang="en-US" smtClean="0"/>
+              <a:pPr/>
               <a:t>‹#›</a:t>
             </a:fld>
             <a:endParaRPr lang="en-US"/>
@@ -2465,7 +2501,8 @@
           <a:p>
             <a:fld id="{CDF17EBE-DCEA-5640-B5EF-B0CBFC45875D}" type="datetimeFigureOut">
               <a:rPr lang="en-US" smtClean="0"/>
-              <a:t>1/22/15</a:t>
+              <a:pPr/>
+              <a:t>1/23/15</a:t>
             </a:fld>
             <a:endParaRPr lang="en-US"/>
           </a:p>
@@ -2512,6 +2549,7 @@
           <a:p>
             <a:fld id="{EA9BA1ED-F0E7-DD4C-B400-D6DEFA0D5747}" type="slidenum">
               <a:rPr lang="en-US" smtClean="0"/>
+              <a:pPr/>
               <a:t>‹#›</a:t>
             </a:fld>
             <a:endParaRPr lang="en-US"/>
@@ -3236,7 +3274,8 @@
           <a:p>
             <a:fld id="{CDF17EBE-DCEA-5640-B5EF-B0CBFC45875D}" type="datetimeFigureOut">
               <a:rPr lang="en-US" smtClean="0"/>
-              <a:t>1/22/15</a:t>
+              <a:pPr/>
+              <a:t>1/23/15</a:t>
             </a:fld>
             <a:endParaRPr lang="en-US"/>
           </a:p>
@@ -3314,6 +3353,7 @@
           <a:p>
             <a:fld id="{EA9BA1ED-F0E7-DD4C-B400-D6DEFA0D5747}" type="slidenum">
               <a:rPr lang="en-US" smtClean="0"/>
+              <a:pPr/>
               <a:t>‹#›</a:t>
             </a:fld>
             <a:endParaRPr lang="en-US"/>
@@ -4078,7 +4118,7 @@
         <p:spPr/>
         <p:txBody>
           <a:bodyPr>
-            <a:normAutofit fontScale="92500"/>
+            <a:normAutofit lnSpcReduction="10000"/>
           </a:bodyPr>
           <a:lstStyle/>
           <a:p>
@@ -4236,11 +4276,7 @@
             <a:pPr lvl="1"/>
             <a:r>
               <a:rPr lang="en-US" dirty="0" smtClean="0"/>
-              <a:t>Must create battery </a:t>
-            </a:r>
-            <a:r>
-              <a:rPr lang="en-US" dirty="0" smtClean="0"/>
-              <a:t>harness</a:t>
+              <a:t>Must create battery harness</a:t>
             </a:r>
           </a:p>
           <a:p>
@@ -4397,7 +4433,68 @@
           <a:bodyPr/>
           <a:lstStyle/>
           <a:p>
-            <a:endParaRPr lang="en-US"/>
+            <a:r>
+              <a:rPr lang="en-US" dirty="0" smtClean="0"/>
+              <a:t>User interface - command line, better – GUI</a:t>
+            </a:r>
+          </a:p>
+          <a:p>
+            <a:pPr lvl="1"/>
+            <a:r>
+              <a:rPr lang="en-US" dirty="0" smtClean="0"/>
+              <a:t>User’s input : recording and stand-by interval, sample rate, delay for start</a:t>
+            </a:r>
+          </a:p>
+          <a:p>
+            <a:pPr lvl="1"/>
+            <a:r>
+              <a:rPr lang="en-US" dirty="0" smtClean="0"/>
+              <a:t>Response: </a:t>
+            </a:r>
+          </a:p>
+          <a:p>
+            <a:pPr lvl="2"/>
+            <a:r>
+              <a:rPr lang="en-US" dirty="0" smtClean="0"/>
+              <a:t>Set-up configuration if the inputs are “good”</a:t>
+            </a:r>
+          </a:p>
+          <a:p>
+            <a:pPr lvl="2"/>
+            <a:r>
+              <a:rPr lang="en-US" dirty="0" smtClean="0"/>
+              <a:t>Estimated maximum operation time of the system</a:t>
+            </a:r>
+          </a:p>
+          <a:p>
+            <a:pPr lvl="2"/>
+            <a:r>
+              <a:rPr lang="en-US" dirty="0" smtClean="0"/>
+              <a:t>Ask for confirmation</a:t>
+            </a:r>
+          </a:p>
+          <a:p>
+            <a:pPr lvl="1"/>
+            <a:r>
+              <a:rPr lang="en-US" dirty="0" smtClean="0"/>
+              <a:t>Output to the system the confirmed operation set-points</a:t>
+            </a:r>
+          </a:p>
+          <a:p>
+            <a:pPr lvl="1"/>
+            <a:r>
+              <a:rPr lang="en-US" dirty="0" smtClean="0"/>
+              <a:t>Display the signal </a:t>
+            </a:r>
+            <a:r>
+              <a:rPr lang="en-US" smtClean="0"/>
+              <a:t>spectogram</a:t>
+            </a:r>
+            <a:endParaRPr lang="en-US" dirty="0" smtClean="0"/>
+          </a:p>
+          <a:p>
+            <a:pPr lvl="1"/>
+            <a:endParaRPr lang="en-US" dirty="0"/>
           </a:p>
         </p:txBody>
       </p:sp>
@@ -4410,6 +4507,131 @@
 </file>
 
 <file path=ppt/slides/slide7.xml><?xml version="1.0" encoding="utf-8"?>
+<p:sld xmlns:a="http://schemas.openxmlformats.org/drawingml/2006/main" xmlns:r="http://schemas.openxmlformats.org/officeDocument/2006/relationships" xmlns:mc="http://schemas.openxmlformats.org/markup-compatibility/2006" xmlns:mv="urn:schemas-microsoft-com:mac:vml" xmlns:p="http://schemas.openxmlformats.org/presentationml/2006/main" mc:Ignorable="mv" mc:PreserveAttributes="mv:*">
+  <p:cSld>
+    <p:spTree>
+      <p:nvGrpSpPr>
+        <p:cNvPr id="1" name=""/>
+        <p:cNvGrpSpPr/>
+        <p:nvPr/>
+      </p:nvGrpSpPr>
+      <p:grpSpPr>
+        <a:xfrm>
+          <a:off x="0" y="0"/>
+          <a:ext cx="0" cy="0"/>
+          <a:chOff x="0" y="0"/>
+          <a:chExt cx="0" cy="0"/>
+        </a:xfrm>
+      </p:grpSpPr>
+      <p:sp>
+        <p:nvSpPr>
+          <p:cNvPr id="2" name="Title 1"/>
+          <p:cNvSpPr>
+            <a:spLocks noGrp="1"/>
+          </p:cNvSpPr>
+          <p:nvPr>
+            <p:ph type="title"/>
+          </p:nvPr>
+        </p:nvSpPr>
+        <p:spPr/>
+        <p:txBody>
+          <a:bodyPr/>
+          <a:lstStyle/>
+          <a:p>
+            <a:r>
+              <a:rPr lang="en-US" dirty="0" smtClean="0"/>
+              <a:t>Software</a:t>
+            </a:r>
+            <a:endParaRPr lang="en-US" dirty="0"/>
+          </a:p>
+        </p:txBody>
+      </p:sp>
+      <p:sp>
+        <p:nvSpPr>
+          <p:cNvPr id="3" name="Content Placeholder 2"/>
+          <p:cNvSpPr>
+            <a:spLocks noGrp="1"/>
+          </p:cNvSpPr>
+          <p:nvPr>
+            <p:ph idx="1"/>
+          </p:nvPr>
+        </p:nvSpPr>
+        <p:spPr/>
+        <p:txBody>
+          <a:bodyPr/>
+          <a:lstStyle/>
+          <a:p>
+            <a:r>
+              <a:rPr lang="en-US" dirty="0" smtClean="0"/>
+              <a:t>System:</a:t>
+            </a:r>
+          </a:p>
+          <a:p>
+            <a:pPr lvl="1"/>
+            <a:r>
+              <a:rPr lang="en-US" dirty="0" smtClean="0"/>
+              <a:t>Control the operation:</a:t>
+            </a:r>
+          </a:p>
+          <a:p>
+            <a:pPr lvl="2"/>
+            <a:r>
+              <a:rPr lang="en-US" dirty="0" smtClean="0"/>
+              <a:t>As per programed schedule -Interrupt from RTC</a:t>
+            </a:r>
+          </a:p>
+          <a:p>
+            <a:pPr lvl="2"/>
+            <a:r>
+              <a:rPr lang="en-US" dirty="0" smtClean="0"/>
+              <a:t>Manage the data storage </a:t>
+            </a:r>
+          </a:p>
+          <a:p>
+            <a:pPr lvl="3"/>
+            <a:r>
+              <a:rPr lang="en-US" dirty="0" smtClean="0"/>
+              <a:t>Store data to SD card</a:t>
+            </a:r>
+          </a:p>
+          <a:p>
+            <a:pPr lvl="3"/>
+            <a:r>
+              <a:rPr lang="en-US" dirty="0" smtClean="0"/>
+              <a:t>Reset power when SD card “full” for switching to the next available SD card</a:t>
+            </a:r>
+          </a:p>
+          <a:p>
+            <a:pPr lvl="2"/>
+            <a:r>
+              <a:rPr lang="en-US" dirty="0" smtClean="0"/>
+              <a:t>Manage the interfere between programmed schedule (RTC interrupt) and storage process.</a:t>
+            </a:r>
+          </a:p>
+          <a:p>
+            <a:pPr lvl="3"/>
+            <a:endParaRPr lang="en-US" dirty="0" smtClean="0"/>
+          </a:p>
+          <a:p>
+            <a:pPr lvl="1"/>
+            <a:endParaRPr lang="en-US" dirty="0"/>
+          </a:p>
+        </p:txBody>
+      </p:sp>
+    </p:spTree>
+    <p:extLst>
+      <p:ext uri="{BB962C8B-B14F-4D97-AF65-F5344CB8AC3E}">
+        <p14:creationId xmlns:p14="http://schemas.microsoft.com/office/powerpoint/2010/main" xmlns:p="http://schemas.openxmlformats.org/presentationml/2006/main" xmlns:r="http://schemas.openxmlformats.org/officeDocument/2006/relationships" xmlns:a="http://schemas.openxmlformats.org/drawingml/2006/main" xmlns="" val="3290971186"/>
+      </p:ext>
+    </p:extLst>
+  </p:cSld>
+  <p:clrMapOvr>
+    <a:masterClrMapping/>
+  </p:clrMapOvr>
+</p:sld>
+</file>
+
+<file path=ppt/slides/slide8.xml><?xml version="1.0" encoding="utf-8"?>
 <p:sld xmlns:a="http://schemas.openxmlformats.org/drawingml/2006/main" xmlns:r="http://schemas.openxmlformats.org/officeDocument/2006/relationships" xmlns:mc="http://schemas.openxmlformats.org/markup-compatibility/2006" xmlns:mv="urn:schemas-microsoft-com:mac:vml" xmlns:p="http://schemas.openxmlformats.org/presentationml/2006/main" mc:Ignorable="mv" mc:PreserveAttributes="mv:*">
   <p:cSld>
     <p:spTree>

</xml_diff>

<commit_message>
Added Trevors pp slides and meeting minute start
</commit_message>
<xml_diff>
--- a/CapstoneAssignments/CapstoneProposal.pptx
+++ b/CapstoneAssignments/CapstoneProposal.pptx
@@ -10,9 +10,11 @@
     <p:sldId id="258" r:id="rId4"/>
     <p:sldId id="259" r:id="rId5"/>
     <p:sldId id="260" r:id="rId6"/>
-    <p:sldId id="261" r:id="rId7"/>
-    <p:sldId id="263" r:id="rId8"/>
-    <p:sldId id="262" r:id="rId9"/>
+    <p:sldId id="264" r:id="rId7"/>
+    <p:sldId id="265" r:id="rId8"/>
+    <p:sldId id="261" r:id="rId9"/>
+    <p:sldId id="263" r:id="rId10"/>
+    <p:sldId id="262" r:id="rId11"/>
   </p:sldIdLst>
   <p:sldSz cx="9144000" cy="6858000" type="screen4x3"/>
   <p:notesSz cx="6858000" cy="9144000"/>
@@ -113,7 +115,7 @@
   </p:defaultTextStyle>
   <p:extLst>
     <p:ext uri="{EFAFB233-063F-42B5-8137-9DF3F51BA10A}">
-      <p15:sldGuideLst xmlns:p15="http://schemas.microsoft.com/office/powerpoint/2012/main" xmlns:p="http://schemas.openxmlformats.org/presentationml/2006/main" xmlns:r="http://schemas.openxmlformats.org/officeDocument/2006/relationships" xmlns:a="http://schemas.openxmlformats.org/drawingml/2006/main" xmlns="">
+      <p15:sldGuideLst xmlns:mc="http://schemas.openxmlformats.org/markup-compatibility/2006" xmlns:mv="urn:schemas-microsoft-com:mac:vml" xmlns:p15="http://schemas.microsoft.com/office/powerpoint/2012/main" xmlns="" xmlns:p="http://schemas.openxmlformats.org/presentationml/2006/main" xmlns:r="http://schemas.openxmlformats.org/officeDocument/2006/relationships" xmlns:a="http://schemas.openxmlformats.org/drawingml/2006/main">
         <p15:guide id="1" orient="horz" pos="2160">
           <p15:clr>
             <a:srgbClr val="A4A3A4"/>
@@ -3982,6 +3984,73 @@
 </p:sld>
 </file>
 
+<file path=ppt/slides/slide10.xml><?xml version="1.0" encoding="utf-8"?>
+<p:sld xmlns:a="http://schemas.openxmlformats.org/drawingml/2006/main" xmlns:r="http://schemas.openxmlformats.org/officeDocument/2006/relationships" xmlns:mc="http://schemas.openxmlformats.org/markup-compatibility/2006" xmlns:mv="urn:schemas-microsoft-com:mac:vml" xmlns:p="http://schemas.openxmlformats.org/presentationml/2006/main" mc:Ignorable="mv" mc:PreserveAttributes="mv:*">
+  <p:cSld>
+    <p:spTree>
+      <p:nvGrpSpPr>
+        <p:cNvPr id="1" name=""/>
+        <p:cNvGrpSpPr/>
+        <p:nvPr/>
+      </p:nvGrpSpPr>
+      <p:grpSpPr>
+        <a:xfrm>
+          <a:off x="0" y="0"/>
+          <a:ext cx="0" cy="0"/>
+          <a:chOff x="0" y="0"/>
+          <a:chExt cx="0" cy="0"/>
+        </a:xfrm>
+      </p:grpSpPr>
+      <p:sp>
+        <p:nvSpPr>
+          <p:cNvPr id="2" name="Title 1"/>
+          <p:cNvSpPr>
+            <a:spLocks noGrp="1"/>
+          </p:cNvSpPr>
+          <p:nvPr>
+            <p:ph type="title"/>
+          </p:nvPr>
+        </p:nvSpPr>
+        <p:spPr/>
+        <p:txBody>
+          <a:bodyPr/>
+          <a:lstStyle/>
+          <a:p>
+            <a:r>
+              <a:rPr lang="en-US" dirty="0" smtClean="0"/>
+              <a:t>Schedule</a:t>
+            </a:r>
+            <a:endParaRPr lang="en-US" dirty="0"/>
+          </a:p>
+        </p:txBody>
+      </p:sp>
+      <p:sp>
+        <p:nvSpPr>
+          <p:cNvPr id="3" name="Content Placeholder 2"/>
+          <p:cNvSpPr>
+            <a:spLocks noGrp="1"/>
+          </p:cNvSpPr>
+          <p:nvPr>
+            <p:ph idx="1"/>
+          </p:nvPr>
+        </p:nvSpPr>
+        <p:spPr/>
+        <p:txBody>
+          <a:bodyPr/>
+          <a:lstStyle/>
+          <a:p>
+            <a:endParaRPr lang="en-US"/>
+          </a:p>
+        </p:txBody>
+      </p:sp>
+    </p:spTree>
+  </p:cSld>
+  <p:clrMapOvr>
+    <a:masterClrMapping/>
+  </p:clrMapOvr>
+</p:sld>
+</file>
+
 <file path=ppt/slides/slide2.xml><?xml version="1.0" encoding="utf-8"?>
 <p:sld xmlns:a="http://schemas.openxmlformats.org/drawingml/2006/main" xmlns:r="http://schemas.openxmlformats.org/officeDocument/2006/relationships" xmlns:mc="http://schemas.openxmlformats.org/markup-compatibility/2006" xmlns:mv="urn:schemas-microsoft-com:mac:vml" xmlns:p="http://schemas.openxmlformats.org/presentationml/2006/main" mc:Ignorable="mv" mc:PreserveAttributes="mv:*">
   <p:cSld>
@@ -4410,11 +4479,7 @@
           <a:bodyPr/>
           <a:lstStyle/>
           <a:p>
-            <a:r>
-              <a:rPr lang="en-US" dirty="0" smtClean="0"/>
-              <a:t>Software</a:t>
-            </a:r>
-            <a:endParaRPr lang="en-US" dirty="0"/>
+            <a:endParaRPr lang="en-US"/>
           </a:p>
         </p:txBody>
       </p:sp>
@@ -4433,72 +4498,16 @@
           <a:bodyPr/>
           <a:lstStyle/>
           <a:p>
-            <a:r>
-              <a:rPr lang="en-US" dirty="0" smtClean="0"/>
-              <a:t>User interface - command line, better – GUI</a:t>
-            </a:r>
-          </a:p>
-          <a:p>
-            <a:pPr lvl="1"/>
-            <a:r>
-              <a:rPr lang="en-US" dirty="0" smtClean="0"/>
-              <a:t>User’s input : recording and stand-by interval, sample rate, delay for start</a:t>
-            </a:r>
-          </a:p>
-          <a:p>
-            <a:pPr lvl="1"/>
-            <a:r>
-              <a:rPr lang="en-US" dirty="0" smtClean="0"/>
-              <a:t>Response: </a:t>
-            </a:r>
-          </a:p>
-          <a:p>
-            <a:pPr lvl="2"/>
-            <a:r>
-              <a:rPr lang="en-US" dirty="0" smtClean="0"/>
-              <a:t>Set-up configuration if the inputs are “good”</a:t>
-            </a:r>
-          </a:p>
-          <a:p>
-            <a:pPr lvl="2"/>
-            <a:r>
-              <a:rPr lang="en-US" dirty="0" smtClean="0"/>
-              <a:t>Estimated maximum operation time of the system</a:t>
-            </a:r>
-          </a:p>
-          <a:p>
-            <a:pPr lvl="2"/>
-            <a:r>
-              <a:rPr lang="en-US" dirty="0" smtClean="0"/>
-              <a:t>Ask for confirmation</a:t>
-            </a:r>
-          </a:p>
-          <a:p>
-            <a:pPr lvl="1"/>
-            <a:r>
-              <a:rPr lang="en-US" dirty="0" smtClean="0"/>
-              <a:t>Output to the system the confirmed operation set-points</a:t>
-            </a:r>
-          </a:p>
-          <a:p>
-            <a:pPr lvl="1"/>
-            <a:r>
-              <a:rPr lang="en-US" dirty="0" smtClean="0"/>
-              <a:t>Display the signal </a:t>
-            </a:r>
-            <a:r>
-              <a:rPr lang="en-US" smtClean="0"/>
-              <a:t>spectogram</a:t>
-            </a:r>
-            <a:endParaRPr lang="en-US" dirty="0" smtClean="0"/>
-          </a:p>
-          <a:p>
-            <a:pPr lvl="1"/>
-            <a:endParaRPr lang="en-US" dirty="0"/>
+            <a:endParaRPr lang="en-US"/>
           </a:p>
         </p:txBody>
       </p:sp>
     </p:spTree>
+    <p:extLst>
+      <p:ext uri="{BB962C8B-B14F-4D97-AF65-F5344CB8AC3E}">
+        <p14:creationId xmlns:p14="http://schemas.microsoft.com/office/powerpoint/2010/main" xmlns:p="http://schemas.openxmlformats.org/presentationml/2006/main" xmlns:r="http://schemas.openxmlformats.org/officeDocument/2006/relationships" xmlns:a="http://schemas.openxmlformats.org/drawingml/2006/main" xmlns="" val="897816095"/>
+      </p:ext>
+    </p:extLst>
   </p:cSld>
   <p:clrMapOvr>
     <a:masterClrMapping/>
@@ -4540,7 +4549,15 @@
           <a:p>
             <a:r>
               <a:rPr lang="en-US" dirty="0" smtClean="0"/>
-              <a:t>Software</a:t>
+              <a:t>Hardware – </a:t>
+            </a:r>
+            <a:r>
+              <a:rPr lang="en-US" dirty="0" err="1" smtClean="0"/>
+              <a:t>MicroSD</a:t>
+            </a:r>
+            <a:r>
+              <a:rPr lang="en-US" dirty="0" smtClean="0"/>
+              <a:t> Storage</a:t>
             </a:r>
             <a:endParaRPr lang="en-US" dirty="0"/>
           </a:p>
@@ -4558,62 +4575,53 @@
         </p:nvSpPr>
         <p:spPr/>
         <p:txBody>
-          <a:bodyPr/>
-          <a:lstStyle/>
-          <a:p>
+          <a:bodyPr>
+            <a:normAutofit/>
+          </a:bodyPr>
+          <a:lstStyle/>
+          <a:p>
+            <a:r>
+              <a:rPr lang="en-US" dirty="0"/>
+              <a:t>2x Fairchild FSSD06 Multiplexer</a:t>
+            </a:r>
+          </a:p>
+          <a:p>
+            <a:r>
+              <a:rPr lang="en-US" dirty="0"/>
+              <a:t>Each MUX interfaces 2x micro SD cards </a:t>
+            </a:r>
             <a:r>
               <a:rPr lang="en-US" dirty="0" smtClean="0"/>
-              <a:t>System:</a:t>
+              <a:t>each</a:t>
+            </a:r>
+          </a:p>
+          <a:p>
+            <a:r>
+              <a:rPr lang="en-US" dirty="0" smtClean="0"/>
+              <a:t>4 micro SD cards total, 128GB combined total storage</a:t>
+            </a:r>
+            <a:endParaRPr lang="en-US" dirty="0"/>
+          </a:p>
+          <a:p>
+            <a:r>
+              <a:rPr lang="en-US" dirty="0"/>
+              <a:t>Each MUX input shares DAT bus connections from DSP on TASCAM</a:t>
             </a:r>
           </a:p>
           <a:p>
             <a:pPr lvl="1"/>
             <a:r>
-              <a:rPr lang="en-US" dirty="0" smtClean="0"/>
-              <a:t>Control the operation:</a:t>
-            </a:r>
-          </a:p>
-          <a:p>
-            <a:pPr lvl="2"/>
-            <a:r>
-              <a:rPr lang="en-US" dirty="0" smtClean="0"/>
-              <a:t>As per programed schedule -Interrupt from RTC</a:t>
-            </a:r>
-          </a:p>
-          <a:p>
-            <a:pPr lvl="2"/>
-            <a:r>
-              <a:rPr lang="en-US" dirty="0" smtClean="0"/>
-              <a:t>Manage the data storage </a:t>
-            </a:r>
-          </a:p>
-          <a:p>
-            <a:pPr lvl="3"/>
-            <a:r>
-              <a:rPr lang="en-US" dirty="0" smtClean="0"/>
-              <a:t>Store data to SD card</a:t>
-            </a:r>
-          </a:p>
-          <a:p>
-            <a:pPr lvl="3"/>
-            <a:r>
-              <a:rPr lang="en-US" dirty="0" smtClean="0"/>
-              <a:t>Reset power when SD card “full” for switching to the next available SD card</a:t>
-            </a:r>
-          </a:p>
-          <a:p>
-            <a:pPr lvl="2"/>
-            <a:r>
-              <a:rPr lang="en-US" dirty="0" smtClean="0"/>
-              <a:t>Manage the interfere between programmed schedule (RTC interrupt) and storage process.</a:t>
-            </a:r>
-          </a:p>
-          <a:p>
-            <a:pPr lvl="3"/>
-            <a:endParaRPr lang="en-US" dirty="0" smtClean="0"/>
-          </a:p>
-          <a:p>
-            <a:pPr lvl="1"/>
+              <a:rPr lang="en-US" dirty="0"/>
+              <a:t>Each has an Output Enable pin, when set high inputs have high impedance, no need for additional multiplexing of input signals.</a:t>
+            </a:r>
+          </a:p>
+          <a:p>
+            <a:r>
+              <a:rPr lang="en-US" dirty="0"/>
+              <a:t>Maximum power consumption for entire MUX system &lt;0.01 mA</a:t>
+            </a:r>
+          </a:p>
+          <a:p>
             <a:endParaRPr lang="en-US" dirty="0"/>
           </a:p>
         </p:txBody>
@@ -4621,7 +4629,7 @@
     </p:spTree>
     <p:extLst>
       <p:ext uri="{BB962C8B-B14F-4D97-AF65-F5344CB8AC3E}">
-        <p14:creationId xmlns:p14="http://schemas.microsoft.com/office/powerpoint/2010/main" xmlns:p="http://schemas.openxmlformats.org/presentationml/2006/main" xmlns:r="http://schemas.openxmlformats.org/officeDocument/2006/relationships" xmlns:a="http://schemas.openxmlformats.org/drawingml/2006/main" xmlns="" val="3290971186"/>
+        <p14:creationId xmlns:p14="http://schemas.microsoft.com/office/powerpoint/2010/main" xmlns:p="http://schemas.openxmlformats.org/presentationml/2006/main" xmlns:r="http://schemas.openxmlformats.org/officeDocument/2006/relationships" xmlns:a="http://schemas.openxmlformats.org/drawingml/2006/main" xmlns="" val="3782849377"/>
       </p:ext>
     </p:extLst>
   </p:cSld>
@@ -4665,7 +4673,7 @@
           <a:p>
             <a:r>
               <a:rPr lang="en-US" dirty="0" smtClean="0"/>
-              <a:t>Schedule</a:t>
+              <a:t>Software</a:t>
             </a:r>
             <a:endParaRPr lang="en-US" dirty="0"/>
           </a:p>
@@ -4686,11 +4694,197 @@
           <a:bodyPr/>
           <a:lstStyle/>
           <a:p>
-            <a:endParaRPr lang="en-US"/>
+            <a:r>
+              <a:rPr lang="en-US" dirty="0" smtClean="0"/>
+              <a:t>User interface - command line, better – GUI</a:t>
+            </a:r>
+          </a:p>
+          <a:p>
+            <a:pPr lvl="1"/>
+            <a:r>
+              <a:rPr lang="en-US" dirty="0" smtClean="0"/>
+              <a:t>User’s input : recording and stand-by interval, sample rate, delay for start</a:t>
+            </a:r>
+          </a:p>
+          <a:p>
+            <a:pPr lvl="1"/>
+            <a:r>
+              <a:rPr lang="en-US" dirty="0" smtClean="0"/>
+              <a:t>Response: </a:t>
+            </a:r>
+          </a:p>
+          <a:p>
+            <a:pPr lvl="2"/>
+            <a:r>
+              <a:rPr lang="en-US" dirty="0" smtClean="0"/>
+              <a:t>Set-up configuration if the inputs are “good”</a:t>
+            </a:r>
+          </a:p>
+          <a:p>
+            <a:pPr lvl="2"/>
+            <a:r>
+              <a:rPr lang="en-US" dirty="0" smtClean="0"/>
+              <a:t>Estimated maximum operation time of the system</a:t>
+            </a:r>
+          </a:p>
+          <a:p>
+            <a:pPr lvl="2"/>
+            <a:r>
+              <a:rPr lang="en-US" dirty="0" smtClean="0"/>
+              <a:t>Ask for confirmation</a:t>
+            </a:r>
+          </a:p>
+          <a:p>
+            <a:pPr lvl="1"/>
+            <a:r>
+              <a:rPr lang="en-US" dirty="0" smtClean="0"/>
+              <a:t>Output to the system the confirmed operation set-points</a:t>
+            </a:r>
+          </a:p>
+          <a:p>
+            <a:pPr lvl="1"/>
+            <a:r>
+              <a:rPr lang="en-US" dirty="0" smtClean="0"/>
+              <a:t>Display the signal </a:t>
+            </a:r>
+            <a:r>
+              <a:rPr lang="en-US" smtClean="0"/>
+              <a:t>spectogram</a:t>
+            </a:r>
+            <a:endParaRPr lang="en-US" dirty="0" smtClean="0"/>
+          </a:p>
+          <a:p>
+            <a:pPr lvl="1"/>
+            <a:endParaRPr lang="en-US" dirty="0"/>
           </a:p>
         </p:txBody>
       </p:sp>
     </p:spTree>
+  </p:cSld>
+  <p:clrMapOvr>
+    <a:masterClrMapping/>
+  </p:clrMapOvr>
+</p:sld>
+</file>
+
+<file path=ppt/slides/slide9.xml><?xml version="1.0" encoding="utf-8"?>
+<p:sld xmlns:a="http://schemas.openxmlformats.org/drawingml/2006/main" xmlns:r="http://schemas.openxmlformats.org/officeDocument/2006/relationships" xmlns:mc="http://schemas.openxmlformats.org/markup-compatibility/2006" xmlns:mv="urn:schemas-microsoft-com:mac:vml" xmlns:p="http://schemas.openxmlformats.org/presentationml/2006/main" mc:Ignorable="mv" mc:PreserveAttributes="mv:*">
+  <p:cSld>
+    <p:spTree>
+      <p:nvGrpSpPr>
+        <p:cNvPr id="1" name=""/>
+        <p:cNvGrpSpPr/>
+        <p:nvPr/>
+      </p:nvGrpSpPr>
+      <p:grpSpPr>
+        <a:xfrm>
+          <a:off x="0" y="0"/>
+          <a:ext cx="0" cy="0"/>
+          <a:chOff x="0" y="0"/>
+          <a:chExt cx="0" cy="0"/>
+        </a:xfrm>
+      </p:grpSpPr>
+      <p:sp>
+        <p:nvSpPr>
+          <p:cNvPr id="2" name="Title 1"/>
+          <p:cNvSpPr>
+            <a:spLocks noGrp="1"/>
+          </p:cNvSpPr>
+          <p:nvPr>
+            <p:ph type="title"/>
+          </p:nvPr>
+        </p:nvSpPr>
+        <p:spPr/>
+        <p:txBody>
+          <a:bodyPr/>
+          <a:lstStyle/>
+          <a:p>
+            <a:r>
+              <a:rPr lang="en-US" dirty="0" smtClean="0"/>
+              <a:t>Software</a:t>
+            </a:r>
+            <a:endParaRPr lang="en-US" dirty="0"/>
+          </a:p>
+        </p:txBody>
+      </p:sp>
+      <p:sp>
+        <p:nvSpPr>
+          <p:cNvPr id="3" name="Content Placeholder 2"/>
+          <p:cNvSpPr>
+            <a:spLocks noGrp="1"/>
+          </p:cNvSpPr>
+          <p:nvPr>
+            <p:ph idx="1"/>
+          </p:nvPr>
+        </p:nvSpPr>
+        <p:spPr/>
+        <p:txBody>
+          <a:bodyPr/>
+          <a:lstStyle/>
+          <a:p>
+            <a:r>
+              <a:rPr lang="en-US" dirty="0" smtClean="0"/>
+              <a:t>System:</a:t>
+            </a:r>
+          </a:p>
+          <a:p>
+            <a:pPr lvl="1"/>
+            <a:r>
+              <a:rPr lang="en-US" dirty="0" smtClean="0"/>
+              <a:t>Control the operation:</a:t>
+            </a:r>
+          </a:p>
+          <a:p>
+            <a:pPr lvl="2"/>
+            <a:r>
+              <a:rPr lang="en-US" dirty="0" smtClean="0"/>
+              <a:t>As per programed schedule -Interrupt from RTC</a:t>
+            </a:r>
+          </a:p>
+          <a:p>
+            <a:pPr lvl="2"/>
+            <a:r>
+              <a:rPr lang="en-US" dirty="0" smtClean="0"/>
+              <a:t>Manage the data storage </a:t>
+            </a:r>
+          </a:p>
+          <a:p>
+            <a:pPr lvl="3"/>
+            <a:r>
+              <a:rPr lang="en-US" dirty="0" smtClean="0"/>
+              <a:t>Store data to SD card</a:t>
+            </a:r>
+          </a:p>
+          <a:p>
+            <a:pPr lvl="3"/>
+            <a:r>
+              <a:rPr lang="en-US" dirty="0" smtClean="0"/>
+              <a:t>Reset power when SD card “full” for switching to the next available SD card</a:t>
+            </a:r>
+          </a:p>
+          <a:p>
+            <a:pPr lvl="2"/>
+            <a:r>
+              <a:rPr lang="en-US" dirty="0" smtClean="0"/>
+              <a:t>Manage the interfere between programmed schedule (RTC interrupt) and storage process.</a:t>
+            </a:r>
+          </a:p>
+          <a:p>
+            <a:pPr lvl="3"/>
+            <a:endParaRPr lang="en-US" dirty="0" smtClean="0"/>
+          </a:p>
+          <a:p>
+            <a:pPr lvl="1"/>
+            <a:endParaRPr lang="en-US" dirty="0"/>
+          </a:p>
+        </p:txBody>
+      </p:sp>
+    </p:spTree>
+    <p:extLst>
+      <p:ext uri="{BB962C8B-B14F-4D97-AF65-F5344CB8AC3E}">
+        <p14:creationId xmlns:p14="http://schemas.microsoft.com/office/powerpoint/2010/main" xmlns:p="http://schemas.openxmlformats.org/presentationml/2006/main" xmlns:r="http://schemas.openxmlformats.org/officeDocument/2006/relationships" xmlns:a="http://schemas.openxmlformats.org/drawingml/2006/main" xmlns="" val="3290971186"/>
+      </p:ext>
+    </p:extLst>
   </p:cSld>
   <p:clrMapOvr>
     <a:masterClrMapping/>

</xml_diff>

<commit_message>
Updated power point with notes from meeting and added Phu's updates
</commit_message>
<xml_diff>
--- a/CapstoneAssignments/CapstoneProposal.pptx
+++ b/CapstoneAssignments/CapstoneProposal.pptx
@@ -8,13 +8,16 @@
     <p:sldId id="256" r:id="rId2"/>
     <p:sldId id="257" r:id="rId3"/>
     <p:sldId id="258" r:id="rId4"/>
-    <p:sldId id="259" r:id="rId5"/>
-    <p:sldId id="260" r:id="rId6"/>
-    <p:sldId id="264" r:id="rId7"/>
-    <p:sldId id="265" r:id="rId8"/>
-    <p:sldId id="261" r:id="rId9"/>
-    <p:sldId id="263" r:id="rId10"/>
-    <p:sldId id="262" r:id="rId11"/>
+    <p:sldId id="260" r:id="rId5"/>
+    <p:sldId id="264" r:id="rId6"/>
+    <p:sldId id="266" r:id="rId7"/>
+    <p:sldId id="267" r:id="rId8"/>
+    <p:sldId id="265" r:id="rId9"/>
+    <p:sldId id="268" r:id="rId10"/>
+    <p:sldId id="261" r:id="rId11"/>
+    <p:sldId id="263" r:id="rId12"/>
+    <p:sldId id="269" r:id="rId13"/>
+    <p:sldId id="262" r:id="rId14"/>
   </p:sldIdLst>
   <p:sldSz cx="9144000" cy="6858000" type="screen4x3"/>
   <p:notesSz cx="6858000" cy="9144000"/>
@@ -115,7 +118,7 @@
   </p:defaultTextStyle>
   <p:extLst>
     <p:ext uri="{EFAFB233-063F-42B5-8137-9DF3F51BA10A}">
-      <p15:sldGuideLst xmlns:mc="http://schemas.openxmlformats.org/markup-compatibility/2006" xmlns:mv="urn:schemas-microsoft-com:mac:vml" xmlns:p15="http://schemas.microsoft.com/office/powerpoint/2012/main" xmlns="" xmlns:p="http://schemas.openxmlformats.org/presentationml/2006/main" xmlns:r="http://schemas.openxmlformats.org/officeDocument/2006/relationships" xmlns:a="http://schemas.openxmlformats.org/drawingml/2006/main">
+      <p15:sldGuideLst xmlns:a="http://schemas.openxmlformats.org/drawingml/2006/main" xmlns:r="http://schemas.openxmlformats.org/officeDocument/2006/relationships" xmlns:p="http://schemas.openxmlformats.org/presentationml/2006/main" xmlns="" xmlns:p15="http://schemas.microsoft.com/office/powerpoint/2012/main" xmlns:mv="urn:schemas-microsoft-com:mac:vml" xmlns:mc="http://schemas.openxmlformats.org/markup-compatibility/2006">
         <p15:guide id="1" orient="horz" pos="2160">
           <p15:clr>
             <a:srgbClr val="A4A3A4"/>
@@ -306,7 +309,7 @@
             <a:fld id="{CDF17EBE-DCEA-5640-B5EF-B0CBFC45875D}" type="datetimeFigureOut">
               <a:rPr lang="en-US" smtClean="0"/>
               <a:pPr/>
-              <a:t>1/23/15</a:t>
+              <a:t>1/24/15</a:t>
             </a:fld>
             <a:endParaRPr lang="en-US"/>
           </a:p>
@@ -473,7 +476,7 @@
             <a:fld id="{CDF17EBE-DCEA-5640-B5EF-B0CBFC45875D}" type="datetimeFigureOut">
               <a:rPr lang="en-US" smtClean="0"/>
               <a:pPr/>
-              <a:t>1/23/15</a:t>
+              <a:t>1/24/15</a:t>
             </a:fld>
             <a:endParaRPr lang="en-US"/>
           </a:p>
@@ -650,7 +653,7 @@
             <a:fld id="{CDF17EBE-DCEA-5640-B5EF-B0CBFC45875D}" type="datetimeFigureOut">
               <a:rPr lang="en-US" smtClean="0"/>
               <a:pPr/>
-              <a:t>1/23/15</a:t>
+              <a:t>1/24/15</a:t>
             </a:fld>
             <a:endParaRPr lang="en-US"/>
           </a:p>
@@ -817,7 +820,7 @@
             <a:fld id="{CDF17EBE-DCEA-5640-B5EF-B0CBFC45875D}" type="datetimeFigureOut">
               <a:rPr lang="en-US" smtClean="0"/>
               <a:pPr/>
-              <a:t>1/23/15</a:t>
+              <a:t>1/24/15</a:t>
             </a:fld>
             <a:endParaRPr lang="en-US"/>
           </a:p>
@@ -1061,7 +1064,7 @@
             <a:fld id="{CDF17EBE-DCEA-5640-B5EF-B0CBFC45875D}" type="datetimeFigureOut">
               <a:rPr lang="en-US" smtClean="0"/>
               <a:pPr/>
-              <a:t>1/23/15</a:t>
+              <a:t>1/24/15</a:t>
             </a:fld>
             <a:endParaRPr lang="en-US"/>
           </a:p>
@@ -1327,7 +1330,7 @@
             <a:fld id="{CDF17EBE-DCEA-5640-B5EF-B0CBFC45875D}" type="datetimeFigureOut">
               <a:rPr lang="en-US" smtClean="0"/>
               <a:pPr/>
-              <a:t>1/23/15</a:t>
+              <a:t>1/24/15</a:t>
             </a:fld>
             <a:endParaRPr lang="en-US"/>
           </a:p>
@@ -1707,7 +1710,7 @@
             <a:fld id="{CDF17EBE-DCEA-5640-B5EF-B0CBFC45875D}" type="datetimeFigureOut">
               <a:rPr lang="en-US" smtClean="0"/>
               <a:pPr/>
-              <a:t>1/23/15</a:t>
+              <a:t>1/24/15</a:t>
             </a:fld>
             <a:endParaRPr lang="en-US"/>
           </a:p>
@@ -1859,7 +1862,7 @@
             <a:fld id="{CDF17EBE-DCEA-5640-B5EF-B0CBFC45875D}" type="datetimeFigureOut">
               <a:rPr lang="en-US" smtClean="0"/>
               <a:pPr/>
-              <a:t>1/23/15</a:t>
+              <a:t>1/24/15</a:t>
             </a:fld>
             <a:endParaRPr lang="en-US"/>
           </a:p>
@@ -1951,7 +1954,7 @@
             <a:fld id="{CDF17EBE-DCEA-5640-B5EF-B0CBFC45875D}" type="datetimeFigureOut">
               <a:rPr lang="en-US" smtClean="0"/>
               <a:pPr/>
-              <a:t>1/23/15</a:t>
+              <a:t>1/24/15</a:t>
             </a:fld>
             <a:endParaRPr lang="en-US"/>
           </a:p>
@@ -2214,7 +2217,7 @@
             <a:fld id="{CDF17EBE-DCEA-5640-B5EF-B0CBFC45875D}" type="datetimeFigureOut">
               <a:rPr lang="en-US" smtClean="0"/>
               <a:pPr/>
-              <a:t>1/23/15</a:t>
+              <a:t>1/24/15</a:t>
             </a:fld>
             <a:endParaRPr lang="en-US"/>
           </a:p>
@@ -2504,7 +2507,7 @@
             <a:fld id="{CDF17EBE-DCEA-5640-B5EF-B0CBFC45875D}" type="datetimeFigureOut">
               <a:rPr lang="en-US" smtClean="0"/>
               <a:pPr/>
-              <a:t>1/23/15</a:t>
+              <a:t>1/24/15</a:t>
             </a:fld>
             <a:endParaRPr lang="en-US"/>
           </a:p>
@@ -3277,7 +3280,7 @@
             <a:fld id="{CDF17EBE-DCEA-5640-B5EF-B0CBFC45875D}" type="datetimeFigureOut">
               <a:rPr lang="en-US" smtClean="0"/>
               <a:pPr/>
-              <a:t>1/23/15</a:t>
+              <a:t>1/24/15</a:t>
             </a:fld>
             <a:endParaRPr lang="en-US"/>
           </a:p>
@@ -3915,7 +3918,11 @@
           <a:p>
             <a:r>
               <a:rPr lang="en-US" sz="6000" dirty="0" smtClean="0"/>
-              <a:t>Underwater Sea Glider Audio Recorder</a:t>
+              <a:t>Underwater Glider </a:t>
+            </a:r>
+            <a:r>
+              <a:rPr lang="en-US" sz="6000" dirty="0" smtClean="0"/>
+              <a:t>Audio Recorder</a:t>
             </a:r>
             <a:endParaRPr lang="en-US" sz="6000" dirty="0"/>
           </a:p>
@@ -3931,16 +3938,44 @@
             <p:ph type="subTitle" idx="1"/>
           </p:nvPr>
         </p:nvSpPr>
-        <p:spPr/>
+        <p:spPr>
+          <a:xfrm>
+            <a:off x="533400" y="3228536"/>
+            <a:ext cx="7854696" cy="2486464"/>
+          </a:xfrm>
+        </p:spPr>
         <p:txBody>
           <a:bodyPr>
-            <a:normAutofit fontScale="92500" lnSpcReduction="10000"/>
+            <a:normAutofit/>
           </a:bodyPr>
           <a:lstStyle/>
           <a:p>
             <a:r>
               <a:rPr lang="en-US" dirty="0" smtClean="0"/>
-              <a:t>Team Members: Chelsea Throop</a:t>
+              <a:t>Sponsor: </a:t>
+            </a:r>
+            <a:r>
+              <a:rPr lang="en-US" dirty="0" err="1" smtClean="0"/>
+              <a:t>Metron</a:t>
+            </a:r>
+            <a:r>
+              <a:rPr lang="en-US" dirty="0" smtClean="0"/>
+              <a:t>, Dr. John </a:t>
+            </a:r>
+            <a:r>
+              <a:rPr lang="en-US" dirty="0" err="1" smtClean="0"/>
+              <a:t>Gebbie</a:t>
+            </a:r>
+            <a:endParaRPr lang="en-US" dirty="0" smtClean="0"/>
+          </a:p>
+          <a:p>
+            <a:r>
+              <a:rPr lang="en-US" dirty="0" smtClean="0"/>
+              <a:t>Team </a:t>
+            </a:r>
+            <a:r>
+              <a:rPr lang="en-US" dirty="0" smtClean="0"/>
+              <a:t>Members: Chelsea Throop</a:t>
             </a:r>
           </a:p>
           <a:p>
@@ -4018,6 +4053,369 @@
           <a:p>
             <a:r>
               <a:rPr lang="en-US" dirty="0" smtClean="0"/>
+              <a:t>Software- Pre-Mission</a:t>
+            </a:r>
+            <a:endParaRPr lang="en-US" dirty="0"/>
+          </a:p>
+        </p:txBody>
+      </p:sp>
+      <p:sp>
+        <p:nvSpPr>
+          <p:cNvPr id="3" name="Content Placeholder 2"/>
+          <p:cNvSpPr>
+            <a:spLocks noGrp="1"/>
+          </p:cNvSpPr>
+          <p:nvPr>
+            <p:ph idx="1"/>
+          </p:nvPr>
+        </p:nvSpPr>
+        <p:spPr/>
+        <p:txBody>
+          <a:bodyPr/>
+          <a:lstStyle/>
+          <a:p>
+            <a:endParaRPr lang="en-US" dirty="0" smtClean="0"/>
+          </a:p>
+          <a:p>
+            <a:r>
+              <a:rPr lang="en-US" dirty="0" smtClean="0"/>
+              <a:t>User </a:t>
+            </a:r>
+            <a:r>
+              <a:rPr lang="en-US" dirty="0" smtClean="0"/>
+              <a:t>interface : command line or </a:t>
+            </a:r>
+            <a:r>
+              <a:rPr lang="en-US" dirty="0" smtClean="0"/>
+              <a:t>GUI</a:t>
+            </a:r>
+          </a:p>
+          <a:p>
+            <a:pPr lvl="1"/>
+            <a:r>
+              <a:rPr lang="en-US" dirty="0" smtClean="0"/>
+              <a:t>Allow user to program the schedule by inputting: </a:t>
+            </a:r>
+          </a:p>
+          <a:p>
+            <a:pPr lvl="2"/>
+            <a:r>
+              <a:rPr lang="en-US" dirty="0" smtClean="0"/>
+              <a:t>recording and stand-by interval </a:t>
+            </a:r>
+          </a:p>
+          <a:p>
+            <a:pPr lvl="2"/>
+            <a:r>
+              <a:rPr lang="en-US" dirty="0" smtClean="0"/>
+              <a:t>sample rate </a:t>
+            </a:r>
+          </a:p>
+          <a:p>
+            <a:pPr lvl="2"/>
+            <a:r>
+              <a:rPr lang="en-US" dirty="0" smtClean="0"/>
+              <a:t>delay for start</a:t>
+            </a:r>
+          </a:p>
+          <a:p>
+            <a:pPr lvl="1"/>
+            <a:r>
+              <a:rPr lang="en-US" dirty="0" smtClean="0"/>
+              <a:t>Confirm the schedule if the inputs are “good”</a:t>
+            </a:r>
+          </a:p>
+          <a:p>
+            <a:pPr lvl="1"/>
+            <a:r>
+              <a:rPr lang="en-US" dirty="0" smtClean="0"/>
+              <a:t>Estimate maximum operation time of the system</a:t>
+            </a:r>
+          </a:p>
+          <a:p>
+            <a:pPr lvl="1"/>
+            <a:r>
+              <a:rPr lang="en-US" dirty="0" smtClean="0"/>
+              <a:t>Set the operation parameters for the system</a:t>
+            </a:r>
+          </a:p>
+          <a:p>
+            <a:pPr lvl="1">
+              <a:buNone/>
+            </a:pPr>
+            <a:endParaRPr lang="en-US" dirty="0"/>
+          </a:p>
+        </p:txBody>
+      </p:sp>
+    </p:spTree>
+  </p:cSld>
+  <p:clrMapOvr>
+    <a:masterClrMapping/>
+  </p:clrMapOvr>
+</p:sld>
+</file>
+
+<file path=ppt/slides/slide11.xml><?xml version="1.0" encoding="utf-8"?>
+<p:sld xmlns:a="http://schemas.openxmlformats.org/drawingml/2006/main" xmlns:r="http://schemas.openxmlformats.org/officeDocument/2006/relationships" xmlns:mc="http://schemas.openxmlformats.org/markup-compatibility/2006" xmlns:mv="urn:schemas-microsoft-com:mac:vml" xmlns:p="http://schemas.openxmlformats.org/presentationml/2006/main" mc:Ignorable="mv" mc:PreserveAttributes="mv:*">
+  <p:cSld>
+    <p:spTree>
+      <p:nvGrpSpPr>
+        <p:cNvPr id="1" name=""/>
+        <p:cNvGrpSpPr/>
+        <p:nvPr/>
+      </p:nvGrpSpPr>
+      <p:grpSpPr>
+        <a:xfrm>
+          <a:off x="0" y="0"/>
+          <a:ext cx="0" cy="0"/>
+          <a:chOff x="0" y="0"/>
+          <a:chExt cx="0" cy="0"/>
+        </a:xfrm>
+      </p:grpSpPr>
+      <p:sp>
+        <p:nvSpPr>
+          <p:cNvPr id="2" name="Title 1"/>
+          <p:cNvSpPr>
+            <a:spLocks noGrp="1"/>
+          </p:cNvSpPr>
+          <p:nvPr>
+            <p:ph type="title"/>
+          </p:nvPr>
+        </p:nvSpPr>
+        <p:spPr/>
+        <p:txBody>
+          <a:bodyPr/>
+          <a:lstStyle/>
+          <a:p>
+            <a:r>
+              <a:rPr lang="en-US" dirty="0" smtClean="0"/>
+              <a:t>Software- In-Mission</a:t>
+            </a:r>
+            <a:endParaRPr lang="en-US" dirty="0"/>
+          </a:p>
+        </p:txBody>
+      </p:sp>
+      <p:sp>
+        <p:nvSpPr>
+          <p:cNvPr id="3" name="Content Placeholder 2"/>
+          <p:cNvSpPr>
+            <a:spLocks noGrp="1"/>
+          </p:cNvSpPr>
+          <p:nvPr>
+            <p:ph idx="1"/>
+          </p:nvPr>
+        </p:nvSpPr>
+        <p:spPr/>
+        <p:txBody>
+          <a:bodyPr/>
+          <a:lstStyle/>
+          <a:p>
+            <a:endParaRPr lang="en-US" dirty="0" smtClean="0"/>
+          </a:p>
+          <a:p>
+            <a:r>
+              <a:rPr lang="en-US" dirty="0" smtClean="0"/>
+              <a:t>Control </a:t>
+            </a:r>
+            <a:r>
+              <a:rPr lang="en-US" dirty="0" smtClean="0"/>
+              <a:t>the operation as per </a:t>
+            </a:r>
+            <a:r>
+              <a:rPr lang="en-US" dirty="0" err="1" smtClean="0"/>
+              <a:t>programed</a:t>
+            </a:r>
+            <a:r>
+              <a:rPr lang="en-US" dirty="0" smtClean="0"/>
+              <a:t> schedule</a:t>
+            </a:r>
+          </a:p>
+          <a:p>
+            <a:r>
+              <a:rPr lang="en-US" dirty="0" smtClean="0"/>
+              <a:t>Manage the data storage </a:t>
+            </a:r>
+          </a:p>
+          <a:p>
+            <a:pPr lvl="1"/>
+            <a:r>
+              <a:rPr lang="en-US" dirty="0" smtClean="0"/>
+              <a:t>Store data to SD card</a:t>
+            </a:r>
+          </a:p>
+          <a:p>
+            <a:pPr lvl="1"/>
+            <a:r>
+              <a:rPr lang="en-US" dirty="0" smtClean="0"/>
+              <a:t>Switch to the next available SD card when existing card “full”</a:t>
+            </a:r>
+          </a:p>
+          <a:p>
+            <a:pPr lvl="1"/>
+            <a:r>
+              <a:rPr lang="en-US" dirty="0" smtClean="0"/>
+              <a:t>Reset power of  “</a:t>
+            </a:r>
+            <a:r>
+              <a:rPr lang="en-US" dirty="0" err="1" smtClean="0"/>
+              <a:t>mainboard</a:t>
+            </a:r>
+            <a:r>
+              <a:rPr lang="en-US" dirty="0" smtClean="0"/>
+              <a:t>” to direct the data to targeted SD card </a:t>
+            </a:r>
+          </a:p>
+          <a:p>
+            <a:pPr>
+              <a:buNone/>
+            </a:pPr>
+            <a:endParaRPr lang="en-US" dirty="0" smtClean="0"/>
+          </a:p>
+          <a:p>
+            <a:pPr lvl="1"/>
+            <a:endParaRPr lang="en-US" dirty="0"/>
+          </a:p>
+        </p:txBody>
+      </p:sp>
+    </p:spTree>
+    <p:extLst>
+      <p:ext uri="{BB962C8B-B14F-4D97-AF65-F5344CB8AC3E}">
+        <p14:creationId xmlns="" xmlns:a="http://schemas.openxmlformats.org/drawingml/2006/main" xmlns:r="http://schemas.openxmlformats.org/officeDocument/2006/relationships" xmlns:p="http://schemas.openxmlformats.org/presentationml/2006/main" xmlns:p14="http://schemas.microsoft.com/office/powerpoint/2010/main" xmlns:mv="urn:schemas-microsoft-com:mac:vml" xmlns:mc="http://schemas.openxmlformats.org/markup-compatibility/2006" val="3290971186"/>
+      </p:ext>
+    </p:extLst>
+  </p:cSld>
+  <p:clrMapOvr>
+    <a:masterClrMapping/>
+  </p:clrMapOvr>
+</p:sld>
+</file>
+
+<file path=ppt/slides/slide12.xml><?xml version="1.0" encoding="utf-8"?>
+<p:sld xmlns:a="http://schemas.openxmlformats.org/drawingml/2006/main" xmlns:r="http://schemas.openxmlformats.org/officeDocument/2006/relationships" xmlns:mc="http://schemas.openxmlformats.org/markup-compatibility/2006" xmlns:mv="urn:schemas-microsoft-com:mac:vml" xmlns:p="http://schemas.openxmlformats.org/presentationml/2006/main" mc:Ignorable="mv" mc:PreserveAttributes="mv:*">
+  <p:cSld>
+    <p:spTree>
+      <p:nvGrpSpPr>
+        <p:cNvPr id="1" name=""/>
+        <p:cNvGrpSpPr/>
+        <p:nvPr/>
+      </p:nvGrpSpPr>
+      <p:grpSpPr>
+        <a:xfrm>
+          <a:off x="0" y="0"/>
+          <a:ext cx="0" cy="0"/>
+          <a:chOff x="0" y="0"/>
+          <a:chExt cx="0" cy="0"/>
+        </a:xfrm>
+      </p:grpSpPr>
+      <p:sp>
+        <p:nvSpPr>
+          <p:cNvPr id="2" name="Title 1"/>
+          <p:cNvSpPr>
+            <a:spLocks noGrp="1"/>
+          </p:cNvSpPr>
+          <p:nvPr>
+            <p:ph type="title"/>
+          </p:nvPr>
+        </p:nvSpPr>
+        <p:spPr/>
+        <p:txBody>
+          <a:bodyPr/>
+          <a:lstStyle/>
+          <a:p>
+            <a:r>
+              <a:rPr lang="en-US" dirty="0" smtClean="0"/>
+              <a:t>Software- Post- Mission</a:t>
+            </a:r>
+            <a:endParaRPr lang="en-US" dirty="0"/>
+          </a:p>
+        </p:txBody>
+      </p:sp>
+      <p:sp>
+        <p:nvSpPr>
+          <p:cNvPr id="3" name="Content Placeholder 2"/>
+          <p:cNvSpPr>
+            <a:spLocks noGrp="1"/>
+          </p:cNvSpPr>
+          <p:nvPr>
+            <p:ph idx="1"/>
+          </p:nvPr>
+        </p:nvSpPr>
+        <p:spPr/>
+        <p:txBody>
+          <a:bodyPr/>
+          <a:lstStyle/>
+          <a:p>
+            <a:endParaRPr lang="en-US" dirty="0" smtClean="0"/>
+          </a:p>
+          <a:p>
+            <a:r>
+              <a:rPr lang="en-US" dirty="0" smtClean="0"/>
+              <a:t>Display </a:t>
+            </a:r>
+            <a:r>
+              <a:rPr lang="en-US" dirty="0" smtClean="0"/>
+              <a:t>list of audio files</a:t>
+            </a:r>
+          </a:p>
+          <a:p>
+            <a:r>
+              <a:rPr lang="en-US" dirty="0" smtClean="0"/>
+              <a:t>Allow user to playback the records</a:t>
+            </a:r>
+          </a:p>
+          <a:p>
+            <a:r>
+              <a:rPr lang="en-US" dirty="0" smtClean="0"/>
+              <a:t>Display the spectrogram and plots for analysis</a:t>
+            </a:r>
+          </a:p>
+          <a:p>
+            <a:endParaRPr lang="en-US" dirty="0"/>
+          </a:p>
+        </p:txBody>
+      </p:sp>
+    </p:spTree>
+  </p:cSld>
+  <p:clrMapOvr>
+    <a:masterClrMapping/>
+  </p:clrMapOvr>
+</p:sld>
+</file>
+
+<file path=ppt/slides/slide13.xml><?xml version="1.0" encoding="utf-8"?>
+<p:sld xmlns:a="http://schemas.openxmlformats.org/drawingml/2006/main" xmlns:r="http://schemas.openxmlformats.org/officeDocument/2006/relationships" xmlns:mc="http://schemas.openxmlformats.org/markup-compatibility/2006" xmlns:mv="urn:schemas-microsoft-com:mac:vml" xmlns:p="http://schemas.openxmlformats.org/presentationml/2006/main" mc:Ignorable="mv" mc:PreserveAttributes="mv:*">
+  <p:cSld>
+    <p:spTree>
+      <p:nvGrpSpPr>
+        <p:cNvPr id="1" name=""/>
+        <p:cNvGrpSpPr/>
+        <p:nvPr/>
+      </p:nvGrpSpPr>
+      <p:grpSpPr>
+        <a:xfrm>
+          <a:off x="0" y="0"/>
+          <a:ext cx="0" cy="0"/>
+          <a:chOff x="0" y="0"/>
+          <a:chExt cx="0" cy="0"/>
+        </a:xfrm>
+      </p:grpSpPr>
+      <p:sp>
+        <p:nvSpPr>
+          <p:cNvPr id="2" name="Title 1"/>
+          <p:cNvSpPr>
+            <a:spLocks noGrp="1"/>
+          </p:cNvSpPr>
+          <p:nvPr>
+            <p:ph type="title"/>
+          </p:nvPr>
+        </p:nvSpPr>
+        <p:spPr/>
+        <p:txBody>
+          <a:bodyPr/>
+          <a:lstStyle/>
+          <a:p>
+            <a:r>
+              <a:rPr lang="en-US" dirty="0" smtClean="0"/>
               <a:t>Schedule</a:t>
             </a:r>
             <a:endParaRPr lang="en-US" dirty="0"/>
@@ -4106,21 +4504,61 @@
           <a:bodyPr/>
           <a:lstStyle/>
           <a:p>
-            <a:r>
-              <a:rPr lang="en-US" dirty="0" smtClean="0"/>
-              <a:t>NEAR-Lab Sea Glider currently implements off the shelf recording device</a:t>
-            </a:r>
-          </a:p>
-          <a:p>
-            <a:r>
-              <a:rPr lang="en-US" dirty="0" smtClean="0"/>
-              <a:t>Currently uses two hydrophones to gather acoustic data for oceanographic research</a:t>
-            </a:r>
-          </a:p>
-          <a:p>
-            <a:r>
-              <a:rPr lang="en-US" dirty="0" smtClean="0"/>
-              <a:t>Our goal is to design additional software and hardware to improve the usability of the device</a:t>
+            <a:endParaRPr lang="en-US" dirty="0" smtClean="0"/>
+          </a:p>
+          <a:p>
+            <a:r>
+              <a:rPr lang="en-US" dirty="0" smtClean="0"/>
+              <a:t>There is increased interest in using underwater gliders for marine mammal research and monitoring</a:t>
+            </a:r>
+          </a:p>
+          <a:p>
+            <a:r>
+              <a:rPr lang="en-US" dirty="0" smtClean="0"/>
+              <a:t>NEAR</a:t>
+            </a:r>
+            <a:r>
+              <a:rPr lang="en-US" dirty="0" smtClean="0"/>
+              <a:t>-Lab</a:t>
+            </a:r>
+            <a:r>
+              <a:rPr lang="en-US" dirty="0" smtClean="0"/>
+              <a:t> </a:t>
+            </a:r>
+            <a:r>
+              <a:rPr lang="en-US" dirty="0" smtClean="0"/>
+              <a:t>Webb Slocum</a:t>
+            </a:r>
+            <a:r>
+              <a:rPr lang="en-US" dirty="0" smtClean="0"/>
+              <a:t> </a:t>
+            </a:r>
+            <a:r>
+              <a:rPr lang="en-US" dirty="0" smtClean="0"/>
+              <a:t>Glider</a:t>
+            </a:r>
+            <a:r>
+              <a:rPr lang="en-US" dirty="0" smtClean="0"/>
+              <a:t> has currently implemented an </a:t>
+            </a:r>
+            <a:r>
+              <a:rPr lang="en-US" dirty="0" smtClean="0"/>
+              <a:t>off the shelf recording </a:t>
+            </a:r>
+            <a:r>
+              <a:rPr lang="en-US" dirty="0" smtClean="0"/>
+              <a:t>device with two hydrophones </a:t>
+            </a:r>
+            <a:endParaRPr lang="en-US" dirty="0" smtClean="0"/>
+          </a:p>
+          <a:p>
+            <a:r>
+              <a:rPr lang="en-US" dirty="0" smtClean="0"/>
+              <a:t>Our </a:t>
+            </a:r>
+            <a:r>
+              <a:rPr lang="en-US" dirty="0" smtClean="0"/>
+              <a:t>goal is to design additional software and hardware to improve the usability of the device</a:t>
             </a:r>
             <a:endParaRPr lang="en-US" dirty="0"/>
           </a:p>
@@ -4168,7 +4606,7 @@
           <a:p>
             <a:r>
               <a:rPr lang="en-US" dirty="0" smtClean="0"/>
-              <a:t>Improved Feature Goals</a:t>
+              <a:t>Project Goals</a:t>
             </a:r>
             <a:endParaRPr lang="en-US" dirty="0"/>
           </a:p>
@@ -4187,60 +4625,38 @@
         <p:spPr/>
         <p:txBody>
           <a:bodyPr>
-            <a:normAutofit lnSpcReduction="10000"/>
+            <a:normAutofit/>
           </a:bodyPr>
           <a:lstStyle/>
           <a:p>
-            <a:r>
-              <a:rPr lang="en-US" dirty="0" smtClean="0"/>
-              <a:t>Must be able to interface with TASCAM</a:t>
-            </a:r>
-          </a:p>
-          <a:p>
-            <a:r>
-              <a:rPr lang="en-US" dirty="0" smtClean="0"/>
-              <a:t>Ability to access multiple SD cards</a:t>
+            <a:endParaRPr lang="en-US" dirty="0" smtClean="0"/>
+          </a:p>
+          <a:p>
+            <a:r>
+              <a:rPr lang="en-US" dirty="0" smtClean="0"/>
+              <a:t>To  improve current commercial audio recording device</a:t>
             </a:r>
           </a:p>
           <a:p>
             <a:pPr lvl="1"/>
             <a:r>
               <a:rPr lang="en-US" dirty="0" smtClean="0"/>
-              <a:t>Capable of 4 days of continuous recording</a:t>
-            </a:r>
-          </a:p>
-          <a:p>
-            <a:r>
-              <a:rPr lang="en-US" dirty="0" smtClean="0"/>
-              <a:t>Capable of complex user selectable recording schedule</a:t>
-            </a:r>
-          </a:p>
-          <a:p>
-            <a:r>
-              <a:rPr lang="en-US" dirty="0" smtClean="0"/>
-              <a:t>Recordings must be downloadable to laptop</a:t>
-            </a:r>
-          </a:p>
-          <a:p>
-            <a:r>
-              <a:rPr lang="en-US" dirty="0" smtClean="0"/>
-              <a:t>Time stamps must be synchronized between recording device and GUI on laptop</a:t>
-            </a:r>
-          </a:p>
-          <a:p>
-            <a:r>
-              <a:rPr lang="en-US" dirty="0" smtClean="0"/>
-              <a:t>Must be able to modify sample rate</a:t>
-            </a:r>
-          </a:p>
-          <a:p>
-            <a:r>
-              <a:rPr lang="en-US" dirty="0" smtClean="0"/>
-              <a:t>Must be able to hear and/or display recordings (spectrogram)</a:t>
-            </a:r>
-          </a:p>
-          <a:p>
-            <a:endParaRPr lang="en-US" dirty="0" smtClean="0"/>
+              <a:t>Inexpensive device that includes a user interface</a:t>
+            </a:r>
+          </a:p>
+          <a:p>
+            <a:pPr lvl="1"/>
+            <a:r>
+              <a:rPr lang="en-US" dirty="0" smtClean="0"/>
+              <a:t>Records broadband signals over 30 days with up to 4 days of acoustic data</a:t>
+            </a:r>
+          </a:p>
+          <a:p>
+            <a:pPr lvl="1"/>
+            <a:r>
+              <a:rPr lang="en-US" dirty="0" smtClean="0"/>
+              <a:t>Includes hardware and software updates</a:t>
+            </a:r>
           </a:p>
           <a:p>
             <a:endParaRPr lang="en-US" dirty="0" smtClean="0"/>
@@ -4301,7 +4717,7 @@
           <a:p>
             <a:r>
               <a:rPr lang="en-US" dirty="0" smtClean="0"/>
-              <a:t>Feature Goals (Cont.)</a:t>
+              <a:t>Hardware</a:t>
             </a:r>
             <a:endParaRPr lang="en-US" dirty="0"/>
           </a:p>
@@ -4322,53 +4738,35 @@
           <a:bodyPr/>
           <a:lstStyle/>
           <a:p>
-            <a:r>
-              <a:rPr lang="en-US" dirty="0" smtClean="0"/>
-              <a:t>Reasonable power consumption (alkaline batteries)</a:t>
+            <a:endParaRPr lang="en-US" dirty="0" smtClean="0"/>
+          </a:p>
+          <a:p>
+            <a:r>
+              <a:rPr lang="en-US" dirty="0" smtClean="0"/>
+              <a:t>Three major updates to hardware</a:t>
             </a:r>
           </a:p>
           <a:p>
             <a:pPr lvl="1"/>
             <a:r>
               <a:rPr lang="en-US" dirty="0" smtClean="0"/>
-              <a:t>4 days of continuous recording</a:t>
+              <a:t>Addition of a multiplexor to interchange up to 4 SD cards</a:t>
             </a:r>
           </a:p>
           <a:p>
             <a:pPr lvl="1"/>
             <a:r>
               <a:rPr lang="en-US" dirty="0" smtClean="0"/>
-              <a:t>30 days of sleep mode</a:t>
+              <a:t>Separate Microcontroller unit and Real Time Clock for complex scheduled recordings</a:t>
             </a:r>
           </a:p>
           <a:p>
             <a:pPr lvl="1"/>
             <a:r>
               <a:rPr lang="en-US" dirty="0" smtClean="0"/>
-              <a:t>Must create battery harness</a:t>
-            </a:r>
-          </a:p>
-          <a:p>
-            <a:r>
-              <a:rPr lang="en-US" dirty="0" smtClean="0"/>
-              <a:t>Must develop hardware brackets to mount device in glider</a:t>
-            </a:r>
-          </a:p>
-          <a:p>
-            <a:pPr lvl="1"/>
-            <a:r>
-              <a:rPr lang="en-US" dirty="0" smtClean="0"/>
-              <a:t>This depends on space available in glider</a:t>
-            </a:r>
-          </a:p>
-          <a:p>
-            <a:r>
-              <a:rPr lang="en-US" dirty="0" smtClean="0"/>
-              <a:t>Completed device must weigh less than 0.5 kg</a:t>
-            </a:r>
-          </a:p>
-          <a:p>
-            <a:endParaRPr lang="en-US" dirty="0" smtClean="0"/>
+              <a:t>Button interface for hands-free schedule programming</a:t>
+            </a:r>
+            <a:endParaRPr lang="en-US" dirty="0"/>
           </a:p>
         </p:txBody>
       </p:sp>
@@ -4414,7 +4812,7 @@
           <a:p>
             <a:r>
               <a:rPr lang="en-US" dirty="0" smtClean="0"/>
-              <a:t>Hardware</a:t>
+              <a:t>Hardware- MUX</a:t>
             </a:r>
             <a:endParaRPr lang="en-US" dirty="0"/>
           </a:p>
@@ -4440,6 +4838,11 @@
         </p:txBody>
       </p:sp>
     </p:spTree>
+    <p:extLst>
+      <p:ext uri="{BB962C8B-B14F-4D97-AF65-F5344CB8AC3E}">
+        <p14:creationId xmlns="" xmlns:a="http://schemas.openxmlformats.org/drawingml/2006/main" xmlns:r="http://schemas.openxmlformats.org/officeDocument/2006/relationships" xmlns:p="http://schemas.openxmlformats.org/presentationml/2006/main" xmlns:p14="http://schemas.microsoft.com/office/powerpoint/2010/main" xmlns:mv="urn:schemas-microsoft-com:mac:vml" xmlns:mc="http://schemas.openxmlformats.org/markup-compatibility/2006" val="897816095"/>
+      </p:ext>
+    </p:extLst>
   </p:cSld>
   <p:clrMapOvr>
     <a:masterClrMapping/>
@@ -4479,35 +4882,34 @@
           <a:bodyPr/>
           <a:lstStyle/>
           <a:p>
+            <a:r>
+              <a:rPr lang="en-US" dirty="0" smtClean="0"/>
+              <a:t>Hardware- MCU and RTC</a:t>
+            </a:r>
+            <a:endParaRPr lang="en-US" dirty="0"/>
+          </a:p>
+        </p:txBody>
+      </p:sp>
+      <p:sp>
+        <p:nvSpPr>
+          <p:cNvPr id="3" name="Content Placeholder 2"/>
+          <p:cNvSpPr>
+            <a:spLocks noGrp="1"/>
+          </p:cNvSpPr>
+          <p:nvPr>
+            <p:ph idx="1"/>
+          </p:nvPr>
+        </p:nvSpPr>
+        <p:spPr/>
+        <p:txBody>
+          <a:bodyPr/>
+          <a:lstStyle/>
+          <a:p>
             <a:endParaRPr lang="en-US"/>
           </a:p>
         </p:txBody>
       </p:sp>
-      <p:sp>
-        <p:nvSpPr>
-          <p:cNvPr id="3" name="Content Placeholder 2"/>
-          <p:cNvSpPr>
-            <a:spLocks noGrp="1"/>
-          </p:cNvSpPr>
-          <p:nvPr>
-            <p:ph idx="1"/>
-          </p:nvPr>
-        </p:nvSpPr>
-        <p:spPr/>
-        <p:txBody>
-          <a:bodyPr/>
-          <a:lstStyle/>
-          <a:p>
-            <a:endParaRPr lang="en-US"/>
-          </a:p>
-        </p:txBody>
-      </p:sp>
     </p:spTree>
-    <p:extLst>
-      <p:ext uri="{BB962C8B-B14F-4D97-AF65-F5344CB8AC3E}">
-        <p14:creationId xmlns:p14="http://schemas.microsoft.com/office/powerpoint/2010/main" xmlns:p="http://schemas.openxmlformats.org/presentationml/2006/main" xmlns:r="http://schemas.openxmlformats.org/officeDocument/2006/relationships" xmlns:a="http://schemas.openxmlformats.org/drawingml/2006/main" xmlns="" val="897816095"/>
-      </p:ext>
-    </p:extLst>
   </p:cSld>
   <p:clrMapOvr>
     <a:masterClrMapping/>
@@ -4549,15 +4951,7 @@
           <a:p>
             <a:r>
               <a:rPr lang="en-US" dirty="0" smtClean="0"/>
-              <a:t>Hardware – </a:t>
-            </a:r>
-            <a:r>
-              <a:rPr lang="en-US" dirty="0" err="1" smtClean="0"/>
-              <a:t>MicroSD</a:t>
-            </a:r>
-            <a:r>
-              <a:rPr lang="en-US" dirty="0" smtClean="0"/>
-              <a:t> Storage</a:t>
+              <a:t>Hardware- Button interface</a:t>
             </a:r>
             <a:endParaRPr lang="en-US" dirty="0"/>
           </a:p>
@@ -4575,63 +4969,14 @@
         </p:nvSpPr>
         <p:spPr/>
         <p:txBody>
-          <a:bodyPr>
-            <a:normAutofit/>
-          </a:bodyPr>
-          <a:lstStyle/>
-          <a:p>
-            <a:r>
-              <a:rPr lang="en-US" dirty="0"/>
-              <a:t>2x Fairchild FSSD06 Multiplexer</a:t>
-            </a:r>
-          </a:p>
-          <a:p>
-            <a:r>
-              <a:rPr lang="en-US" dirty="0"/>
-              <a:t>Each MUX interfaces 2x micro SD cards </a:t>
-            </a:r>
-            <a:r>
-              <a:rPr lang="en-US" dirty="0" smtClean="0"/>
-              <a:t>each</a:t>
-            </a:r>
-          </a:p>
-          <a:p>
-            <a:r>
-              <a:rPr lang="en-US" dirty="0" smtClean="0"/>
-              <a:t>4 micro SD cards total, 128GB combined total storage</a:t>
-            </a:r>
-            <a:endParaRPr lang="en-US" dirty="0"/>
-          </a:p>
-          <a:p>
-            <a:r>
-              <a:rPr lang="en-US" dirty="0"/>
-              <a:t>Each MUX input shares DAT bus connections from DSP on TASCAM</a:t>
-            </a:r>
-          </a:p>
-          <a:p>
-            <a:pPr lvl="1"/>
-            <a:r>
-              <a:rPr lang="en-US" dirty="0"/>
-              <a:t>Each has an Output Enable pin, when set high inputs have high impedance, no need for additional multiplexing of input signals.</a:t>
-            </a:r>
-          </a:p>
-          <a:p>
-            <a:r>
-              <a:rPr lang="en-US" dirty="0"/>
-              <a:t>Maximum power consumption for entire MUX system &lt;0.01 mA</a:t>
-            </a:r>
-          </a:p>
-          <a:p>
-            <a:endParaRPr lang="en-US" dirty="0"/>
+          <a:bodyPr/>
+          <a:lstStyle/>
+          <a:p>
+            <a:endParaRPr lang="en-US"/>
           </a:p>
         </p:txBody>
       </p:sp>
     </p:spTree>
-    <p:extLst>
-      <p:ext uri="{BB962C8B-B14F-4D97-AF65-F5344CB8AC3E}">
-        <p14:creationId xmlns:p14="http://schemas.microsoft.com/office/powerpoint/2010/main" xmlns:p="http://schemas.openxmlformats.org/presentationml/2006/main" xmlns:r="http://schemas.openxmlformats.org/officeDocument/2006/relationships" xmlns:a="http://schemas.openxmlformats.org/drawingml/2006/main" xmlns="" val="3782849377"/>
-      </p:ext>
-    </p:extLst>
   </p:cSld>
   <p:clrMapOvr>
     <a:masterClrMapping/>
@@ -4673,7 +5018,15 @@
           <a:p>
             <a:r>
               <a:rPr lang="en-US" dirty="0" smtClean="0"/>
-              <a:t>Software</a:t>
+              <a:t>Hardware – </a:t>
+            </a:r>
+            <a:r>
+              <a:rPr lang="en-US" dirty="0" err="1" smtClean="0"/>
+              <a:t>MicroSD</a:t>
+            </a:r>
+            <a:r>
+              <a:rPr lang="en-US" dirty="0" smtClean="0"/>
+              <a:t> Storage</a:t>
             </a:r>
             <a:endParaRPr lang="en-US" dirty="0"/>
           </a:p>
@@ -4691,75 +5044,63 @@
         </p:nvSpPr>
         <p:spPr/>
         <p:txBody>
-          <a:bodyPr/>
-          <a:lstStyle/>
-          <a:p>
-            <a:r>
-              <a:rPr lang="en-US" dirty="0" smtClean="0"/>
-              <a:t>User interface - command line, better – GUI</a:t>
+          <a:bodyPr>
+            <a:normAutofit/>
+          </a:bodyPr>
+          <a:lstStyle/>
+          <a:p>
+            <a:r>
+              <a:rPr lang="en-US" dirty="0"/>
+              <a:t>2x Fairchild FSSD06 Multiplexer</a:t>
+            </a:r>
+          </a:p>
+          <a:p>
+            <a:r>
+              <a:rPr lang="en-US" dirty="0"/>
+              <a:t>Each MUX interfaces 2x micro SD cards </a:t>
+            </a:r>
+            <a:r>
+              <a:rPr lang="en-US" dirty="0" smtClean="0"/>
+              <a:t>each</a:t>
+            </a:r>
+          </a:p>
+          <a:p>
+            <a:r>
+              <a:rPr lang="en-US" dirty="0" smtClean="0"/>
+              <a:t>4 micro SD cards total, 128GB combined total storage</a:t>
+            </a:r>
+            <a:endParaRPr lang="en-US" dirty="0"/>
+          </a:p>
+          <a:p>
+            <a:r>
+              <a:rPr lang="en-US" dirty="0"/>
+              <a:t>Each MUX input shares DAT bus connections from DSP on TASCAM</a:t>
             </a:r>
           </a:p>
           <a:p>
             <a:pPr lvl="1"/>
             <a:r>
-              <a:rPr lang="en-US" dirty="0" smtClean="0"/>
-              <a:t>User’s input : recording and stand-by interval, sample rate, delay for start</a:t>
-            </a:r>
-          </a:p>
-          <a:p>
-            <a:pPr lvl="1"/>
-            <a:r>
-              <a:rPr lang="en-US" dirty="0" smtClean="0"/>
-              <a:t>Response: </a:t>
-            </a:r>
-          </a:p>
-          <a:p>
-            <a:pPr lvl="2"/>
-            <a:r>
-              <a:rPr lang="en-US" dirty="0" smtClean="0"/>
-              <a:t>Set-up configuration if the inputs are “good”</a:t>
-            </a:r>
-          </a:p>
-          <a:p>
-            <a:pPr lvl="2"/>
-            <a:r>
-              <a:rPr lang="en-US" dirty="0" smtClean="0"/>
-              <a:t>Estimated maximum operation time of the system</a:t>
-            </a:r>
-          </a:p>
-          <a:p>
-            <a:pPr lvl="2"/>
-            <a:r>
-              <a:rPr lang="en-US" dirty="0" smtClean="0"/>
-              <a:t>Ask for confirmation</a:t>
-            </a:r>
-          </a:p>
-          <a:p>
-            <a:pPr lvl="1"/>
-            <a:r>
-              <a:rPr lang="en-US" dirty="0" smtClean="0"/>
-              <a:t>Output to the system the confirmed operation set-points</a:t>
-            </a:r>
-          </a:p>
-          <a:p>
-            <a:pPr lvl="1"/>
-            <a:r>
-              <a:rPr lang="en-US" dirty="0" smtClean="0"/>
-              <a:t>Display the signal </a:t>
-            </a:r>
-            <a:r>
-              <a:rPr lang="en-US" smtClean="0"/>
-              <a:t>spectogram</a:t>
-            </a:r>
-            <a:endParaRPr lang="en-US" dirty="0" smtClean="0"/>
-          </a:p>
-          <a:p>
-            <a:pPr lvl="1"/>
+              <a:rPr lang="en-US" dirty="0"/>
+              <a:t>Each has an Output Enable pin, when set high inputs have high impedance, no need for additional multiplexing of input signals.</a:t>
+            </a:r>
+          </a:p>
+          <a:p>
+            <a:r>
+              <a:rPr lang="en-US" dirty="0"/>
+              <a:t>Maximum power consumption for entire MUX system &lt;0.01 mA</a:t>
+            </a:r>
+          </a:p>
+          <a:p>
             <a:endParaRPr lang="en-US" dirty="0"/>
           </a:p>
         </p:txBody>
       </p:sp>
     </p:spTree>
+    <p:extLst>
+      <p:ext uri="{BB962C8B-B14F-4D97-AF65-F5344CB8AC3E}">
+        <p14:creationId xmlns="" xmlns:a="http://schemas.openxmlformats.org/drawingml/2006/main" xmlns:r="http://schemas.openxmlformats.org/officeDocument/2006/relationships" xmlns:p="http://schemas.openxmlformats.org/presentationml/2006/main" xmlns:p14="http://schemas.microsoft.com/office/powerpoint/2010/main" xmlns:mv="urn:schemas-microsoft-com:mac:vml" xmlns:mc="http://schemas.openxmlformats.org/markup-compatibility/2006" val="3782849377"/>
+      </p:ext>
+    </p:extLst>
   </p:cSld>
   <p:clrMapOvr>
     <a:masterClrMapping/>
@@ -4822,69 +5163,39 @@
           <a:bodyPr/>
           <a:lstStyle/>
           <a:p>
-            <a:r>
-              <a:rPr lang="en-US" dirty="0" smtClean="0"/>
-              <a:t>System:</a:t>
+            <a:endParaRPr lang="en-US" dirty="0" smtClean="0"/>
+          </a:p>
+          <a:p>
+            <a:r>
+              <a:rPr lang="en-US" dirty="0" smtClean="0"/>
+              <a:t>Three major components of software</a:t>
             </a:r>
           </a:p>
           <a:p>
             <a:pPr lvl="1"/>
             <a:r>
               <a:rPr lang="en-US" dirty="0" smtClean="0"/>
-              <a:t>Control the operation:</a:t>
-            </a:r>
-          </a:p>
-          <a:p>
-            <a:pPr lvl="2"/>
-            <a:r>
-              <a:rPr lang="en-US" dirty="0" smtClean="0"/>
-              <a:t>As per programed schedule -Interrupt from RTC</a:t>
-            </a:r>
-          </a:p>
-          <a:p>
-            <a:pPr lvl="2"/>
-            <a:r>
-              <a:rPr lang="en-US" dirty="0" smtClean="0"/>
-              <a:t>Manage the data storage </a:t>
-            </a:r>
-          </a:p>
-          <a:p>
-            <a:pPr lvl="3"/>
-            <a:r>
-              <a:rPr lang="en-US" dirty="0" smtClean="0"/>
-              <a:t>Store data to SD card</a:t>
-            </a:r>
-          </a:p>
-          <a:p>
-            <a:pPr lvl="3"/>
-            <a:r>
-              <a:rPr lang="en-US" dirty="0" smtClean="0"/>
-              <a:t>Reset power when SD card “full” for switching to the next available SD card</a:t>
-            </a:r>
-          </a:p>
-          <a:p>
-            <a:pPr lvl="2"/>
-            <a:r>
-              <a:rPr lang="en-US" dirty="0" smtClean="0"/>
-              <a:t>Manage the interfere between programmed schedule (RTC interrupt) and storage process.</a:t>
-            </a:r>
-          </a:p>
-          <a:p>
-            <a:pPr lvl="3"/>
-            <a:endParaRPr lang="en-US" dirty="0" smtClean="0"/>
+              <a:t>Pre-Mission user interface</a:t>
+            </a:r>
           </a:p>
           <a:p>
             <a:pPr lvl="1"/>
+            <a:r>
+              <a:rPr lang="en-US" dirty="0" smtClean="0"/>
+              <a:t>In-Mission recording schedule control</a:t>
+            </a:r>
+          </a:p>
+          <a:p>
+            <a:pPr lvl="1"/>
+            <a:r>
+              <a:rPr lang="en-US" dirty="0" smtClean="0"/>
+              <a:t>Post-Mission data analysis</a:t>
+            </a:r>
             <a:endParaRPr lang="en-US" dirty="0"/>
           </a:p>
         </p:txBody>
       </p:sp>
     </p:spTree>
-    <p:extLst>
-      <p:ext uri="{BB962C8B-B14F-4D97-AF65-F5344CB8AC3E}">
-        <p14:creationId xmlns:p14="http://schemas.microsoft.com/office/powerpoint/2010/main" xmlns:p="http://schemas.openxmlformats.org/presentationml/2006/main" xmlns:r="http://schemas.openxmlformats.org/officeDocument/2006/relationships" xmlns:a="http://schemas.openxmlformats.org/drawingml/2006/main" xmlns="" val="3290971186"/>
-      </p:ext>
-    </p:extLst>
   </p:cSld>
   <p:clrMapOvr>
     <a:masterClrMapping/>

</xml_diff>

<commit_message>
Added button interface slide
</commit_message>
<xml_diff>
--- a/CapstoneAssignments/CapstoneProposal.pptx
+++ b/CapstoneAssignments/CapstoneProposal.pptx
@@ -118,7 +118,7 @@
   </p:defaultTextStyle>
   <p:extLst>
     <p:ext uri="{EFAFB233-063F-42B5-8137-9DF3F51BA10A}">
-      <p15:sldGuideLst xmlns:a="http://schemas.openxmlformats.org/drawingml/2006/main" xmlns:r="http://schemas.openxmlformats.org/officeDocument/2006/relationships" xmlns:p="http://schemas.openxmlformats.org/presentationml/2006/main" xmlns="" xmlns:p15="http://schemas.microsoft.com/office/powerpoint/2012/main" xmlns:mv="urn:schemas-microsoft-com:mac:vml" xmlns:mc="http://schemas.openxmlformats.org/markup-compatibility/2006">
+      <p15:sldGuideLst xmlns:mc="http://schemas.openxmlformats.org/markup-compatibility/2006" xmlns:mv="urn:schemas-microsoft-com:mac:vml" xmlns:p15="http://schemas.microsoft.com/office/powerpoint/2012/main" xmlns="" xmlns:p="http://schemas.openxmlformats.org/presentationml/2006/main" xmlns:r="http://schemas.openxmlformats.org/officeDocument/2006/relationships" xmlns:a="http://schemas.openxmlformats.org/drawingml/2006/main">
         <p15:guide id="1" orient="horz" pos="2160">
           <p15:clr>
             <a:srgbClr val="A4A3A4"/>
@@ -309,7 +309,7 @@
             <a:fld id="{CDF17EBE-DCEA-5640-B5EF-B0CBFC45875D}" type="datetimeFigureOut">
               <a:rPr lang="en-US" smtClean="0"/>
               <a:pPr/>
-              <a:t>1/24/15</a:t>
+              <a:t>1/25/15</a:t>
             </a:fld>
             <a:endParaRPr lang="en-US"/>
           </a:p>
@@ -476,7 +476,7 @@
             <a:fld id="{CDF17EBE-DCEA-5640-B5EF-B0CBFC45875D}" type="datetimeFigureOut">
               <a:rPr lang="en-US" smtClean="0"/>
               <a:pPr/>
-              <a:t>1/24/15</a:t>
+              <a:t>1/25/15</a:t>
             </a:fld>
             <a:endParaRPr lang="en-US"/>
           </a:p>
@@ -653,7 +653,7 @@
             <a:fld id="{CDF17EBE-DCEA-5640-B5EF-B0CBFC45875D}" type="datetimeFigureOut">
               <a:rPr lang="en-US" smtClean="0"/>
               <a:pPr/>
-              <a:t>1/24/15</a:t>
+              <a:t>1/25/15</a:t>
             </a:fld>
             <a:endParaRPr lang="en-US"/>
           </a:p>
@@ -820,7 +820,7 @@
             <a:fld id="{CDF17EBE-DCEA-5640-B5EF-B0CBFC45875D}" type="datetimeFigureOut">
               <a:rPr lang="en-US" smtClean="0"/>
               <a:pPr/>
-              <a:t>1/24/15</a:t>
+              <a:t>1/25/15</a:t>
             </a:fld>
             <a:endParaRPr lang="en-US"/>
           </a:p>
@@ -1064,7 +1064,7 @@
             <a:fld id="{CDF17EBE-DCEA-5640-B5EF-B0CBFC45875D}" type="datetimeFigureOut">
               <a:rPr lang="en-US" smtClean="0"/>
               <a:pPr/>
-              <a:t>1/24/15</a:t>
+              <a:t>1/25/15</a:t>
             </a:fld>
             <a:endParaRPr lang="en-US"/>
           </a:p>
@@ -1330,7 +1330,7 @@
             <a:fld id="{CDF17EBE-DCEA-5640-B5EF-B0CBFC45875D}" type="datetimeFigureOut">
               <a:rPr lang="en-US" smtClean="0"/>
               <a:pPr/>
-              <a:t>1/24/15</a:t>
+              <a:t>1/25/15</a:t>
             </a:fld>
             <a:endParaRPr lang="en-US"/>
           </a:p>
@@ -1710,7 +1710,7 @@
             <a:fld id="{CDF17EBE-DCEA-5640-B5EF-B0CBFC45875D}" type="datetimeFigureOut">
               <a:rPr lang="en-US" smtClean="0"/>
               <a:pPr/>
-              <a:t>1/24/15</a:t>
+              <a:t>1/25/15</a:t>
             </a:fld>
             <a:endParaRPr lang="en-US"/>
           </a:p>
@@ -1862,7 +1862,7 @@
             <a:fld id="{CDF17EBE-DCEA-5640-B5EF-B0CBFC45875D}" type="datetimeFigureOut">
               <a:rPr lang="en-US" smtClean="0"/>
               <a:pPr/>
-              <a:t>1/24/15</a:t>
+              <a:t>1/25/15</a:t>
             </a:fld>
             <a:endParaRPr lang="en-US"/>
           </a:p>
@@ -1954,7 +1954,7 @@
             <a:fld id="{CDF17EBE-DCEA-5640-B5EF-B0CBFC45875D}" type="datetimeFigureOut">
               <a:rPr lang="en-US" smtClean="0"/>
               <a:pPr/>
-              <a:t>1/24/15</a:t>
+              <a:t>1/25/15</a:t>
             </a:fld>
             <a:endParaRPr lang="en-US"/>
           </a:p>
@@ -2217,7 +2217,7 @@
             <a:fld id="{CDF17EBE-DCEA-5640-B5EF-B0CBFC45875D}" type="datetimeFigureOut">
               <a:rPr lang="en-US" smtClean="0"/>
               <a:pPr/>
-              <a:t>1/24/15</a:t>
+              <a:t>1/25/15</a:t>
             </a:fld>
             <a:endParaRPr lang="en-US"/>
           </a:p>
@@ -2507,7 +2507,7 @@
             <a:fld id="{CDF17EBE-DCEA-5640-B5EF-B0CBFC45875D}" type="datetimeFigureOut">
               <a:rPr lang="en-US" smtClean="0"/>
               <a:pPr/>
-              <a:t>1/24/15</a:t>
+              <a:t>1/25/15</a:t>
             </a:fld>
             <a:endParaRPr lang="en-US"/>
           </a:p>
@@ -3280,7 +3280,7 @@
             <a:fld id="{CDF17EBE-DCEA-5640-B5EF-B0CBFC45875D}" type="datetimeFigureOut">
               <a:rPr lang="en-US" smtClean="0"/>
               <a:pPr/>
-              <a:t>1/24/15</a:t>
+              <a:t>1/25/15</a:t>
             </a:fld>
             <a:endParaRPr lang="en-US"/>
           </a:p>
@@ -3918,11 +3918,7 @@
           <a:p>
             <a:r>
               <a:rPr lang="en-US" sz="6000" dirty="0" smtClean="0"/>
-              <a:t>Underwater Glider </a:t>
-            </a:r>
-            <a:r>
-              <a:rPr lang="en-US" sz="6000" dirty="0" smtClean="0"/>
-              <a:t>Audio Recorder</a:t>
+              <a:t>Underwater Glider Audio Recorder</a:t>
             </a:r>
             <a:endParaRPr lang="en-US" sz="6000" dirty="0"/>
           </a:p>
@@ -3971,11 +3967,7 @@
           <a:p>
             <a:r>
               <a:rPr lang="en-US" dirty="0" smtClean="0"/>
-              <a:t>Team </a:t>
-            </a:r>
-            <a:r>
-              <a:rPr lang="en-US" dirty="0" smtClean="0"/>
-              <a:t>Members: Chelsea Throop</a:t>
+              <a:t>Team Members: Chelsea Throop</a:t>
             </a:r>
           </a:p>
           <a:p>
@@ -4079,15 +4071,7 @@
           <a:p>
             <a:r>
               <a:rPr lang="en-US" dirty="0" smtClean="0"/>
-              <a:t>User </a:t>
-            </a:r>
-            <a:r>
-              <a:rPr lang="en-US" dirty="0" smtClean="0"/>
-              <a:t>interface : command line or </a:t>
-            </a:r>
-            <a:r>
-              <a:rPr lang="en-US" dirty="0" smtClean="0"/>
-              <a:t>GUI</a:t>
+              <a:t>User interface : command line or GUI</a:t>
             </a:r>
           </a:p>
           <a:p>
@@ -4215,11 +4199,7 @@
           <a:p>
             <a:r>
               <a:rPr lang="en-US" dirty="0" smtClean="0"/>
-              <a:t>Control </a:t>
-            </a:r>
-            <a:r>
-              <a:rPr lang="en-US" dirty="0" smtClean="0"/>
-              <a:t>the operation as per </a:t>
+              <a:t>Control the operation as per </a:t>
             </a:r>
             <a:r>
               <a:rPr lang="en-US" dirty="0" err="1" smtClean="0"/>
@@ -4280,7 +4260,7 @@
     </p:spTree>
     <p:extLst>
       <p:ext uri="{BB962C8B-B14F-4D97-AF65-F5344CB8AC3E}">
-        <p14:creationId xmlns="" xmlns:a="http://schemas.openxmlformats.org/drawingml/2006/main" xmlns:r="http://schemas.openxmlformats.org/officeDocument/2006/relationships" xmlns:p="http://schemas.openxmlformats.org/presentationml/2006/main" xmlns:p14="http://schemas.microsoft.com/office/powerpoint/2010/main" xmlns:mv="urn:schemas-microsoft-com:mac:vml" xmlns:mc="http://schemas.openxmlformats.org/markup-compatibility/2006" val="3290971186"/>
+        <p14:creationId xmlns:mc="http://schemas.openxmlformats.org/markup-compatibility/2006" xmlns:mv="urn:schemas-microsoft-com:mac:vml" xmlns:p14="http://schemas.microsoft.com/office/powerpoint/2010/main" xmlns:p="http://schemas.openxmlformats.org/presentationml/2006/main" xmlns:r="http://schemas.openxmlformats.org/officeDocument/2006/relationships" xmlns:a="http://schemas.openxmlformats.org/drawingml/2006/main" xmlns="" val="3290971186"/>
       </p:ext>
     </p:extLst>
   </p:cSld>
@@ -4350,11 +4330,7 @@
           <a:p>
             <a:r>
               <a:rPr lang="en-US" dirty="0" smtClean="0"/>
-              <a:t>Display </a:t>
-            </a:r>
-            <a:r>
-              <a:rPr lang="en-US" dirty="0" smtClean="0"/>
-              <a:t>list of audio files</a:t>
+              <a:t>Display list of audio files</a:t>
             </a:r>
           </a:p>
           <a:p>
@@ -4515,50 +4491,13 @@
           <a:p>
             <a:r>
               <a:rPr lang="en-US" dirty="0" smtClean="0"/>
-              <a:t>NEAR</a:t>
-            </a:r>
-            <a:r>
-              <a:rPr lang="en-US" dirty="0" smtClean="0"/>
-              <a:t>-Lab</a:t>
-            </a:r>
-            <a:r>
-              <a:rPr lang="en-US" dirty="0" smtClean="0"/>
-              <a:t> </a:t>
-            </a:r>
-            <a:r>
-              <a:rPr lang="en-US" dirty="0" smtClean="0"/>
-              <a:t>Webb Slocum</a:t>
-            </a:r>
-            <a:r>
-              <a:rPr lang="en-US" dirty="0" smtClean="0"/>
-              <a:t> </a:t>
-            </a:r>
-            <a:r>
-              <a:rPr lang="en-US" dirty="0" smtClean="0"/>
-              <a:t>Glider</a:t>
-            </a:r>
-            <a:r>
-              <a:rPr lang="en-US" dirty="0" smtClean="0"/>
-              <a:t> has currently implemented an </a:t>
-            </a:r>
-            <a:r>
-              <a:rPr lang="en-US" dirty="0" smtClean="0"/>
-              <a:t>off the shelf recording </a:t>
-            </a:r>
-            <a:r>
-              <a:rPr lang="en-US" dirty="0" smtClean="0"/>
-              <a:t>device with two hydrophones </a:t>
-            </a:r>
-            <a:endParaRPr lang="en-US" dirty="0" smtClean="0"/>
-          </a:p>
-          <a:p>
-            <a:r>
-              <a:rPr lang="en-US" dirty="0" smtClean="0"/>
-              <a:t>Our </a:t>
-            </a:r>
-            <a:r>
-              <a:rPr lang="en-US" dirty="0" smtClean="0"/>
-              <a:t>goal is to design additional software and hardware to improve the usability of the device</a:t>
+              <a:t>NEAR-Lab Webb Slocum Glider has currently implemented an off the shelf recording device with two hydrophones </a:t>
+            </a:r>
+          </a:p>
+          <a:p>
+            <a:r>
+              <a:rPr lang="en-US" dirty="0" smtClean="0"/>
+              <a:t>Our goal is to design additional software and hardware to improve the usability of the device</a:t>
             </a:r>
             <a:endParaRPr lang="en-US" dirty="0"/>
           </a:p>
@@ -4840,7 +4779,7 @@
     </p:spTree>
     <p:extLst>
       <p:ext uri="{BB962C8B-B14F-4D97-AF65-F5344CB8AC3E}">
-        <p14:creationId xmlns="" xmlns:a="http://schemas.openxmlformats.org/drawingml/2006/main" xmlns:r="http://schemas.openxmlformats.org/officeDocument/2006/relationships" xmlns:p="http://schemas.openxmlformats.org/presentationml/2006/main" xmlns:p14="http://schemas.microsoft.com/office/powerpoint/2010/main" xmlns:mv="urn:schemas-microsoft-com:mac:vml" xmlns:mc="http://schemas.openxmlformats.org/markup-compatibility/2006" val="897816095"/>
+        <p14:creationId xmlns:mc="http://schemas.openxmlformats.org/markup-compatibility/2006" xmlns:mv="urn:schemas-microsoft-com:mac:vml" xmlns:p14="http://schemas.microsoft.com/office/powerpoint/2010/main" xmlns:p="http://schemas.openxmlformats.org/presentationml/2006/main" xmlns:r="http://schemas.openxmlformats.org/officeDocument/2006/relationships" xmlns:a="http://schemas.openxmlformats.org/drawingml/2006/main" xmlns="" val="897816095"/>
       </p:ext>
     </p:extLst>
   </p:cSld>
@@ -4972,7 +4911,32 @@
           <a:bodyPr/>
           <a:lstStyle/>
           <a:p>
-            <a:endParaRPr lang="en-US"/>
+            <a:endParaRPr lang="en-US" smtClean="0"/>
+          </a:p>
+          <a:p>
+            <a:r>
+              <a:rPr lang="en-US" smtClean="0"/>
+              <a:t>Must </a:t>
+            </a:r>
+            <a:r>
+              <a:rPr lang="en-US" dirty="0" smtClean="0"/>
+              <a:t>be able </a:t>
+            </a:r>
+            <a:r>
+              <a:rPr lang="en-US" dirty="0" smtClean="0"/>
+              <a:t>turn on and record with out manually pressing buttons</a:t>
+            </a:r>
+          </a:p>
+          <a:p>
+            <a:r>
+              <a:rPr lang="en-US" dirty="0" smtClean="0"/>
+              <a:t>Requires </a:t>
+            </a:r>
+            <a:r>
+              <a:rPr lang="en-US" dirty="0" smtClean="0"/>
+              <a:t>connection to send electrical signals as if button sequence is being pressed</a:t>
+            </a:r>
+            <a:endParaRPr lang="en-US" dirty="0"/>
           </a:p>
         </p:txBody>
       </p:sp>
@@ -5098,7 +5062,7 @@
     </p:spTree>
     <p:extLst>
       <p:ext uri="{BB962C8B-B14F-4D97-AF65-F5344CB8AC3E}">
-        <p14:creationId xmlns="" xmlns:a="http://schemas.openxmlformats.org/drawingml/2006/main" xmlns:r="http://schemas.openxmlformats.org/officeDocument/2006/relationships" xmlns:p="http://schemas.openxmlformats.org/presentationml/2006/main" xmlns:p14="http://schemas.microsoft.com/office/powerpoint/2010/main" xmlns:mv="urn:schemas-microsoft-com:mac:vml" xmlns:mc="http://schemas.openxmlformats.org/markup-compatibility/2006" val="3782849377"/>
+        <p14:creationId xmlns:mc="http://schemas.openxmlformats.org/markup-compatibility/2006" xmlns:mv="urn:schemas-microsoft-com:mac:vml" xmlns:p14="http://schemas.microsoft.com/office/powerpoint/2010/main" xmlns:p="http://schemas.openxmlformats.org/presentationml/2006/main" xmlns:r="http://schemas.openxmlformats.org/officeDocument/2006/relationships" xmlns:a="http://schemas.openxmlformats.org/drawingml/2006/main" xmlns="" val="3782849377"/>
       </p:ext>
     </p:extLst>
   </p:cSld>

</xml_diff>

<commit_message>
Added Trevor and Saidas slides
</commit_message>
<xml_diff>
--- a/CapstoneAssignments/CapstoneProposal.pptx
+++ b/CapstoneAssignments/CapstoneProposal.pptx
@@ -11,13 +11,14 @@
     <p:sldId id="260" r:id="rId5"/>
     <p:sldId id="264" r:id="rId6"/>
     <p:sldId id="266" r:id="rId7"/>
-    <p:sldId id="267" r:id="rId8"/>
-    <p:sldId id="265" r:id="rId9"/>
-    <p:sldId id="268" r:id="rId10"/>
-    <p:sldId id="261" r:id="rId11"/>
-    <p:sldId id="263" r:id="rId12"/>
-    <p:sldId id="269" r:id="rId13"/>
-    <p:sldId id="262" r:id="rId14"/>
+    <p:sldId id="270" r:id="rId8"/>
+    <p:sldId id="267" r:id="rId9"/>
+    <p:sldId id="265" r:id="rId10"/>
+    <p:sldId id="268" r:id="rId11"/>
+    <p:sldId id="261" r:id="rId12"/>
+    <p:sldId id="263" r:id="rId13"/>
+    <p:sldId id="269" r:id="rId14"/>
+    <p:sldId id="262" r:id="rId15"/>
   </p:sldIdLst>
   <p:sldSz cx="9144000" cy="6858000" type="screen4x3"/>
   <p:notesSz cx="6858000" cy="9144000"/>
@@ -118,7 +119,7 @@
   </p:defaultTextStyle>
   <p:extLst>
     <p:ext uri="{EFAFB233-063F-42B5-8137-9DF3F51BA10A}">
-      <p15:sldGuideLst xmlns:mc="http://schemas.openxmlformats.org/markup-compatibility/2006" xmlns:mv="urn:schemas-microsoft-com:mac:vml" xmlns:p15="http://schemas.microsoft.com/office/powerpoint/2012/main" xmlns="" xmlns:p="http://schemas.openxmlformats.org/presentationml/2006/main" xmlns:r="http://schemas.openxmlformats.org/officeDocument/2006/relationships" xmlns:a="http://schemas.openxmlformats.org/drawingml/2006/main">
+      <p15:sldGuideLst xmlns:a="http://schemas.openxmlformats.org/drawingml/2006/main" xmlns:r="http://schemas.openxmlformats.org/officeDocument/2006/relationships" xmlns:p="http://schemas.openxmlformats.org/presentationml/2006/main" xmlns="" xmlns:p15="http://schemas.microsoft.com/office/powerpoint/2012/main" xmlns:mv="urn:schemas-microsoft-com:mac:vml" xmlns:mc="http://schemas.openxmlformats.org/markup-compatibility/2006">
         <p15:guide id="1" orient="horz" pos="2160">
           <p15:clr>
             <a:srgbClr val="A4A3A4"/>
@@ -309,7 +310,7 @@
             <a:fld id="{CDF17EBE-DCEA-5640-B5EF-B0CBFC45875D}" type="datetimeFigureOut">
               <a:rPr lang="en-US" smtClean="0"/>
               <a:pPr/>
-              <a:t>1/25/15</a:t>
+              <a:t>1/26/15</a:t>
             </a:fld>
             <a:endParaRPr lang="en-US"/>
           </a:p>
@@ -476,7 +477,7 @@
             <a:fld id="{CDF17EBE-DCEA-5640-B5EF-B0CBFC45875D}" type="datetimeFigureOut">
               <a:rPr lang="en-US" smtClean="0"/>
               <a:pPr/>
-              <a:t>1/25/15</a:t>
+              <a:t>1/26/15</a:t>
             </a:fld>
             <a:endParaRPr lang="en-US"/>
           </a:p>
@@ -653,7 +654,7 @@
             <a:fld id="{CDF17EBE-DCEA-5640-B5EF-B0CBFC45875D}" type="datetimeFigureOut">
               <a:rPr lang="en-US" smtClean="0"/>
               <a:pPr/>
-              <a:t>1/25/15</a:t>
+              <a:t>1/26/15</a:t>
             </a:fld>
             <a:endParaRPr lang="en-US"/>
           </a:p>
@@ -820,7 +821,7 @@
             <a:fld id="{CDF17EBE-DCEA-5640-B5EF-B0CBFC45875D}" type="datetimeFigureOut">
               <a:rPr lang="en-US" smtClean="0"/>
               <a:pPr/>
-              <a:t>1/25/15</a:t>
+              <a:t>1/26/15</a:t>
             </a:fld>
             <a:endParaRPr lang="en-US"/>
           </a:p>
@@ -1064,7 +1065,7 @@
             <a:fld id="{CDF17EBE-DCEA-5640-B5EF-B0CBFC45875D}" type="datetimeFigureOut">
               <a:rPr lang="en-US" smtClean="0"/>
               <a:pPr/>
-              <a:t>1/25/15</a:t>
+              <a:t>1/26/15</a:t>
             </a:fld>
             <a:endParaRPr lang="en-US"/>
           </a:p>
@@ -1330,7 +1331,7 @@
             <a:fld id="{CDF17EBE-DCEA-5640-B5EF-B0CBFC45875D}" type="datetimeFigureOut">
               <a:rPr lang="en-US" smtClean="0"/>
               <a:pPr/>
-              <a:t>1/25/15</a:t>
+              <a:t>1/26/15</a:t>
             </a:fld>
             <a:endParaRPr lang="en-US"/>
           </a:p>
@@ -1710,7 +1711,7 @@
             <a:fld id="{CDF17EBE-DCEA-5640-B5EF-B0CBFC45875D}" type="datetimeFigureOut">
               <a:rPr lang="en-US" smtClean="0"/>
               <a:pPr/>
-              <a:t>1/25/15</a:t>
+              <a:t>1/26/15</a:t>
             </a:fld>
             <a:endParaRPr lang="en-US"/>
           </a:p>
@@ -1862,7 +1863,7 @@
             <a:fld id="{CDF17EBE-DCEA-5640-B5EF-B0CBFC45875D}" type="datetimeFigureOut">
               <a:rPr lang="en-US" smtClean="0"/>
               <a:pPr/>
-              <a:t>1/25/15</a:t>
+              <a:t>1/26/15</a:t>
             </a:fld>
             <a:endParaRPr lang="en-US"/>
           </a:p>
@@ -1954,7 +1955,7 @@
             <a:fld id="{CDF17EBE-DCEA-5640-B5EF-B0CBFC45875D}" type="datetimeFigureOut">
               <a:rPr lang="en-US" smtClean="0"/>
               <a:pPr/>
-              <a:t>1/25/15</a:t>
+              <a:t>1/26/15</a:t>
             </a:fld>
             <a:endParaRPr lang="en-US"/>
           </a:p>
@@ -2217,7 +2218,7 @@
             <a:fld id="{CDF17EBE-DCEA-5640-B5EF-B0CBFC45875D}" type="datetimeFigureOut">
               <a:rPr lang="en-US" smtClean="0"/>
               <a:pPr/>
-              <a:t>1/25/15</a:t>
+              <a:t>1/26/15</a:t>
             </a:fld>
             <a:endParaRPr lang="en-US"/>
           </a:p>
@@ -2507,7 +2508,7 @@
             <a:fld id="{CDF17EBE-DCEA-5640-B5EF-B0CBFC45875D}" type="datetimeFigureOut">
               <a:rPr lang="en-US" smtClean="0"/>
               <a:pPr/>
-              <a:t>1/25/15</a:t>
+              <a:t>1/26/15</a:t>
             </a:fld>
             <a:endParaRPr lang="en-US"/>
           </a:p>
@@ -3280,7 +3281,7 @@
             <a:fld id="{CDF17EBE-DCEA-5640-B5EF-B0CBFC45875D}" type="datetimeFigureOut">
               <a:rPr lang="en-US" smtClean="0"/>
               <a:pPr/>
-              <a:t>1/25/15</a:t>
+              <a:t>1/26/15</a:t>
             </a:fld>
             <a:endParaRPr lang="en-US"/>
           </a:p>
@@ -4045,7 +4046,7 @@
           <a:p>
             <a:r>
               <a:rPr lang="en-US" dirty="0" smtClean="0"/>
-              <a:t>Software- Pre-Mission</a:t>
+              <a:t>Software</a:t>
             </a:r>
             <a:endParaRPr lang="en-US" dirty="0"/>
           </a:p>
@@ -4071,62 +4072,29 @@
           <a:p>
             <a:r>
               <a:rPr lang="en-US" dirty="0" smtClean="0"/>
-              <a:t>User interface : command line or GUI</a:t>
+              <a:t>Three major components of software</a:t>
             </a:r>
           </a:p>
           <a:p>
             <a:pPr lvl="1"/>
             <a:r>
               <a:rPr lang="en-US" dirty="0" smtClean="0"/>
-              <a:t>Allow user to program the schedule by inputting: </a:t>
-            </a:r>
-          </a:p>
-          <a:p>
-            <a:pPr lvl="2"/>
-            <a:r>
-              <a:rPr lang="en-US" dirty="0" smtClean="0"/>
-              <a:t>recording and stand-by interval </a:t>
-            </a:r>
-          </a:p>
-          <a:p>
-            <a:pPr lvl="2"/>
-            <a:r>
-              <a:rPr lang="en-US" dirty="0" smtClean="0"/>
-              <a:t>sample rate </a:t>
-            </a:r>
-          </a:p>
-          <a:p>
-            <a:pPr lvl="2"/>
-            <a:r>
-              <a:rPr lang="en-US" dirty="0" smtClean="0"/>
-              <a:t>delay for start</a:t>
+              <a:t>Pre-Mission user interface</a:t>
             </a:r>
           </a:p>
           <a:p>
             <a:pPr lvl="1"/>
             <a:r>
               <a:rPr lang="en-US" dirty="0" smtClean="0"/>
-              <a:t>Confirm the schedule if the inputs are “good”</a:t>
+              <a:t>In-Mission recording schedule control</a:t>
             </a:r>
           </a:p>
           <a:p>
             <a:pPr lvl="1"/>
             <a:r>
               <a:rPr lang="en-US" dirty="0" smtClean="0"/>
-              <a:t>Estimate maximum operation time of the system</a:t>
-            </a:r>
-          </a:p>
-          <a:p>
-            <a:pPr lvl="1"/>
-            <a:r>
-              <a:rPr lang="en-US" dirty="0" smtClean="0"/>
-              <a:t>Set the operation parameters for the system</a:t>
-            </a:r>
-          </a:p>
-          <a:p>
-            <a:pPr lvl="1">
-              <a:buNone/>
-            </a:pPr>
+              <a:t>Post-Mission data analysis</a:t>
+            </a:r>
             <a:endParaRPr lang="en-US" dirty="0"/>
           </a:p>
         </p:txBody>
@@ -4173,7 +4141,7 @@
           <a:p>
             <a:r>
               <a:rPr lang="en-US" dirty="0" smtClean="0"/>
-              <a:t>Software- In-Mission</a:t>
+              <a:t>Software- Pre-Mission</a:t>
             </a:r>
             <a:endParaRPr lang="en-US" dirty="0"/>
           </a:p>
@@ -4199,70 +4167,67 @@
           <a:p>
             <a:r>
               <a:rPr lang="en-US" dirty="0" smtClean="0"/>
-              <a:t>Control the operation as per </a:t>
-            </a:r>
-            <a:r>
-              <a:rPr lang="en-US" dirty="0" err="1" smtClean="0"/>
-              <a:t>programed</a:t>
-            </a:r>
-            <a:r>
-              <a:rPr lang="en-US" dirty="0" smtClean="0"/>
-              <a:t> schedule</a:t>
-            </a:r>
-          </a:p>
-          <a:p>
-            <a:r>
-              <a:rPr lang="en-US" dirty="0" smtClean="0"/>
-              <a:t>Manage the data storage </a:t>
+              <a:t>User interface : command line or GUI</a:t>
             </a:r>
           </a:p>
           <a:p>
             <a:pPr lvl="1"/>
             <a:r>
               <a:rPr lang="en-US" dirty="0" smtClean="0"/>
-              <a:t>Store data to SD card</a:t>
+              <a:t>Allow user to program the schedule by inputting: </a:t>
+            </a:r>
+          </a:p>
+          <a:p>
+            <a:pPr lvl="2"/>
+            <a:r>
+              <a:rPr lang="en-US" dirty="0" smtClean="0"/>
+              <a:t>recording and stand-by interval </a:t>
+            </a:r>
+          </a:p>
+          <a:p>
+            <a:pPr lvl="2"/>
+            <a:r>
+              <a:rPr lang="en-US" dirty="0" smtClean="0"/>
+              <a:t>sample rate </a:t>
+            </a:r>
+          </a:p>
+          <a:p>
+            <a:pPr lvl="2"/>
+            <a:r>
+              <a:rPr lang="en-US" dirty="0" smtClean="0"/>
+              <a:t>delay for start</a:t>
             </a:r>
           </a:p>
           <a:p>
             <a:pPr lvl="1"/>
             <a:r>
               <a:rPr lang="en-US" dirty="0" smtClean="0"/>
-              <a:t>Switch to the next available SD card when existing card “full”</a:t>
+              <a:t>Confirm the schedule if the inputs are “good”</a:t>
             </a:r>
           </a:p>
           <a:p>
             <a:pPr lvl="1"/>
             <a:r>
               <a:rPr lang="en-US" dirty="0" smtClean="0"/>
-              <a:t>Reset power of  “</a:t>
-            </a:r>
-            <a:r>
-              <a:rPr lang="en-US" dirty="0" err="1" smtClean="0"/>
-              <a:t>mainboard</a:t>
-            </a:r>
-            <a:r>
-              <a:rPr lang="en-US" dirty="0" smtClean="0"/>
-              <a:t>” to direct the data to targeted SD card </a:t>
-            </a:r>
-          </a:p>
-          <a:p>
-            <a:pPr>
+              <a:t>Estimate maximum operation time of the system</a:t>
+            </a:r>
+          </a:p>
+          <a:p>
+            <a:pPr lvl="1"/>
+            <a:r>
+              <a:rPr lang="en-US" dirty="0" smtClean="0"/>
+              <a:t>Set the operation parameters for the system</a:t>
+            </a:r>
+          </a:p>
+          <a:p>
+            <a:pPr lvl="1">
               <a:buNone/>
             </a:pPr>
-            <a:endParaRPr lang="en-US" dirty="0" smtClean="0"/>
-          </a:p>
-          <a:p>
-            <a:pPr lvl="1"/>
             <a:endParaRPr lang="en-US" dirty="0"/>
           </a:p>
         </p:txBody>
       </p:sp>
     </p:spTree>
-    <p:extLst>
-      <p:ext uri="{BB962C8B-B14F-4D97-AF65-F5344CB8AC3E}">
-        <p14:creationId xmlns:mc="http://schemas.openxmlformats.org/markup-compatibility/2006" xmlns:mv="urn:schemas-microsoft-com:mac:vml" xmlns:p14="http://schemas.microsoft.com/office/powerpoint/2010/main" xmlns:p="http://schemas.openxmlformats.org/presentationml/2006/main" xmlns:r="http://schemas.openxmlformats.org/officeDocument/2006/relationships" xmlns:a="http://schemas.openxmlformats.org/drawingml/2006/main" xmlns="" val="3290971186"/>
-      </p:ext>
-    </p:extLst>
   </p:cSld>
   <p:clrMapOvr>
     <a:masterClrMapping/>
@@ -4304,6 +4269,137 @@
           <a:p>
             <a:r>
               <a:rPr lang="en-US" dirty="0" smtClean="0"/>
+              <a:t>Software- In-Mission</a:t>
+            </a:r>
+            <a:endParaRPr lang="en-US" dirty="0"/>
+          </a:p>
+        </p:txBody>
+      </p:sp>
+      <p:sp>
+        <p:nvSpPr>
+          <p:cNvPr id="3" name="Content Placeholder 2"/>
+          <p:cNvSpPr>
+            <a:spLocks noGrp="1"/>
+          </p:cNvSpPr>
+          <p:nvPr>
+            <p:ph idx="1"/>
+          </p:nvPr>
+        </p:nvSpPr>
+        <p:spPr/>
+        <p:txBody>
+          <a:bodyPr/>
+          <a:lstStyle/>
+          <a:p>
+            <a:endParaRPr lang="en-US" dirty="0" smtClean="0"/>
+          </a:p>
+          <a:p>
+            <a:r>
+              <a:rPr lang="en-US" dirty="0" smtClean="0"/>
+              <a:t>Control the operation as per </a:t>
+            </a:r>
+            <a:r>
+              <a:rPr lang="en-US" dirty="0" err="1" smtClean="0"/>
+              <a:t>programed</a:t>
+            </a:r>
+            <a:r>
+              <a:rPr lang="en-US" dirty="0" smtClean="0"/>
+              <a:t> schedule</a:t>
+            </a:r>
+          </a:p>
+          <a:p>
+            <a:r>
+              <a:rPr lang="en-US" dirty="0" smtClean="0"/>
+              <a:t>Manage the data storage </a:t>
+            </a:r>
+          </a:p>
+          <a:p>
+            <a:pPr lvl="1"/>
+            <a:r>
+              <a:rPr lang="en-US" dirty="0" smtClean="0"/>
+              <a:t>Store data to SD card</a:t>
+            </a:r>
+          </a:p>
+          <a:p>
+            <a:pPr lvl="1"/>
+            <a:r>
+              <a:rPr lang="en-US" dirty="0" smtClean="0"/>
+              <a:t>Switch to the next available SD card when existing card “full”</a:t>
+            </a:r>
+          </a:p>
+          <a:p>
+            <a:pPr lvl="1"/>
+            <a:r>
+              <a:rPr lang="en-US" dirty="0" smtClean="0"/>
+              <a:t>Reset power of  “</a:t>
+            </a:r>
+            <a:r>
+              <a:rPr lang="en-US" dirty="0" err="1" smtClean="0"/>
+              <a:t>mainboard</a:t>
+            </a:r>
+            <a:r>
+              <a:rPr lang="en-US" dirty="0" smtClean="0"/>
+              <a:t>” to direct the data to targeted SD card </a:t>
+            </a:r>
+          </a:p>
+          <a:p>
+            <a:pPr>
+              <a:buNone/>
+            </a:pPr>
+            <a:endParaRPr lang="en-US" dirty="0" smtClean="0"/>
+          </a:p>
+          <a:p>
+            <a:pPr lvl="1"/>
+            <a:endParaRPr lang="en-US" dirty="0"/>
+          </a:p>
+        </p:txBody>
+      </p:sp>
+    </p:spTree>
+    <p:extLst>
+      <p:ext uri="{BB962C8B-B14F-4D97-AF65-F5344CB8AC3E}">
+        <p14:creationId xmlns="" xmlns:a="http://schemas.openxmlformats.org/drawingml/2006/main" xmlns:r="http://schemas.openxmlformats.org/officeDocument/2006/relationships" xmlns:p="http://schemas.openxmlformats.org/presentationml/2006/main" xmlns:p14="http://schemas.microsoft.com/office/powerpoint/2010/main" xmlns:mv="urn:schemas-microsoft-com:mac:vml" xmlns:mc="http://schemas.openxmlformats.org/markup-compatibility/2006" val="3290971186"/>
+      </p:ext>
+    </p:extLst>
+  </p:cSld>
+  <p:clrMapOvr>
+    <a:masterClrMapping/>
+  </p:clrMapOvr>
+</p:sld>
+</file>
+
+<file path=ppt/slides/slide13.xml><?xml version="1.0" encoding="utf-8"?>
+<p:sld xmlns:a="http://schemas.openxmlformats.org/drawingml/2006/main" xmlns:r="http://schemas.openxmlformats.org/officeDocument/2006/relationships" xmlns:mc="http://schemas.openxmlformats.org/markup-compatibility/2006" xmlns:mv="urn:schemas-microsoft-com:mac:vml" xmlns:p="http://schemas.openxmlformats.org/presentationml/2006/main" mc:Ignorable="mv" mc:PreserveAttributes="mv:*">
+  <p:cSld>
+    <p:spTree>
+      <p:nvGrpSpPr>
+        <p:cNvPr id="1" name=""/>
+        <p:cNvGrpSpPr/>
+        <p:nvPr/>
+      </p:nvGrpSpPr>
+      <p:grpSpPr>
+        <a:xfrm>
+          <a:off x="0" y="0"/>
+          <a:ext cx="0" cy="0"/>
+          <a:chOff x="0" y="0"/>
+          <a:chExt cx="0" cy="0"/>
+        </a:xfrm>
+      </p:grpSpPr>
+      <p:sp>
+        <p:nvSpPr>
+          <p:cNvPr id="2" name="Title 1"/>
+          <p:cNvSpPr>
+            <a:spLocks noGrp="1"/>
+          </p:cNvSpPr>
+          <p:nvPr>
+            <p:ph type="title"/>
+          </p:nvPr>
+        </p:nvSpPr>
+        <p:spPr/>
+        <p:txBody>
+          <a:bodyPr/>
+          <a:lstStyle/>
+          <a:p>
+            <a:r>
+              <a:rPr lang="en-US" dirty="0" smtClean="0"/>
               <a:t>Software- Post- Mission</a:t>
             </a:r>
             <a:endParaRPr lang="en-US" dirty="0"/>
@@ -4358,7 +4454,7 @@
 </p:sld>
 </file>
 
-<file path=ppt/slides/slide13.xml><?xml version="1.0" encoding="utf-8"?>
+<file path=ppt/slides/slide14.xml><?xml version="1.0" encoding="utf-8"?>
 <p:sld xmlns:a="http://schemas.openxmlformats.org/drawingml/2006/main" xmlns:r="http://schemas.openxmlformats.org/officeDocument/2006/relationships" xmlns:mc="http://schemas.openxmlformats.org/markup-compatibility/2006" xmlns:mv="urn:schemas-microsoft-com:mac:vml" xmlns:p="http://schemas.openxmlformats.org/presentationml/2006/main" mc:Ignorable="mv" mc:PreserveAttributes="mv:*">
   <p:cSld>
     <p:spTree>
@@ -4751,7 +4847,11 @@
           <a:p>
             <a:r>
               <a:rPr lang="en-US" dirty="0" smtClean="0"/>
-              <a:t>Hardware- MUX</a:t>
+              <a:t>Hardware-</a:t>
+            </a:r>
+            <a:r>
+              <a:rPr lang="en-US" dirty="0" smtClean="0"/>
+              <a:t> Data Storage	</a:t>
             </a:r>
             <a:endParaRPr lang="en-US" dirty="0"/>
           </a:p>
@@ -4769,17 +4869,74 @@
         </p:nvSpPr>
         <p:spPr/>
         <p:txBody>
-          <a:bodyPr/>
-          <a:lstStyle/>
-          <a:p>
-            <a:endParaRPr lang="en-US"/>
+          <a:bodyPr>
+            <a:normAutofit fontScale="92500"/>
+          </a:bodyPr>
+          <a:lstStyle/>
+          <a:p>
+            <a:r>
+              <a:rPr lang="en-US" dirty="0" smtClean="0"/>
+              <a:t>DSP on TASCAM supports SDHC carts with FAT32 file format</a:t>
+            </a:r>
+          </a:p>
+          <a:p>
+            <a:pPr lvl="1"/>
+            <a:r>
+              <a:rPr lang="en-US" dirty="0" smtClean="0"/>
+              <a:t>32GB max on pre-formatted SDHC cards. </a:t>
+            </a:r>
+          </a:p>
+          <a:p>
+            <a:r>
+              <a:rPr lang="en-US" dirty="0" smtClean="0"/>
+              <a:t>Multiple SD cards needed to meet storage requirements.</a:t>
+            </a:r>
+          </a:p>
+          <a:p>
+            <a:pPr lvl="1"/>
+            <a:r>
+              <a:rPr lang="en-US" dirty="0" smtClean="0"/>
+              <a:t>Requires multiplexing data bus to multiple devices</a:t>
+            </a:r>
+          </a:p>
+          <a:p>
+            <a:r>
+              <a:rPr lang="en-US" dirty="0" smtClean="0"/>
+              <a:t>2x Fairchild FSSD06 multiplexer</a:t>
+            </a:r>
+          </a:p>
+          <a:p>
+            <a:r>
+              <a:rPr lang="en-US" dirty="0" smtClean="0"/>
+              <a:t>Each MUX interfaces 2x micro SD cards each</a:t>
+            </a:r>
+          </a:p>
+          <a:p>
+            <a:r>
+              <a:rPr lang="en-US" dirty="0" smtClean="0"/>
+              <a:t>4 micro SD cards total, 128GB combined total storage</a:t>
+            </a:r>
+          </a:p>
+          <a:p>
+            <a:r>
+              <a:rPr lang="en-US" dirty="0" smtClean="0"/>
+              <a:t>Maximum power consumption for entire MUX system is &lt;0.01 </a:t>
+            </a:r>
+            <a:r>
+              <a:rPr lang="en-US" dirty="0" err="1" smtClean="0"/>
+              <a:t>mW</a:t>
+            </a:r>
+            <a:endParaRPr lang="en-US" dirty="0" smtClean="0"/>
+          </a:p>
+          <a:p>
+            <a:endParaRPr lang="en-US" dirty="0"/>
           </a:p>
         </p:txBody>
       </p:sp>
     </p:spTree>
     <p:extLst>
       <p:ext uri="{BB962C8B-B14F-4D97-AF65-F5344CB8AC3E}">
-        <p14:creationId xmlns:mc="http://schemas.openxmlformats.org/markup-compatibility/2006" xmlns:mv="urn:schemas-microsoft-com:mac:vml" xmlns:p14="http://schemas.microsoft.com/office/powerpoint/2010/main" xmlns:p="http://schemas.openxmlformats.org/presentationml/2006/main" xmlns:r="http://schemas.openxmlformats.org/officeDocument/2006/relationships" xmlns:a="http://schemas.openxmlformats.org/drawingml/2006/main" xmlns="" val="897816095"/>
+        <p14:creationId xmlns="" xmlns:a="http://schemas.openxmlformats.org/drawingml/2006/main" xmlns:r="http://schemas.openxmlformats.org/officeDocument/2006/relationships" xmlns:p="http://schemas.openxmlformats.org/presentationml/2006/main" xmlns:p14="http://schemas.microsoft.com/office/powerpoint/2010/main" xmlns:mv="urn:schemas-microsoft-com:mac:vml" xmlns:mc="http://schemas.openxmlformats.org/markup-compatibility/2006" val="897816095"/>
       </p:ext>
     </p:extLst>
   </p:cSld>
@@ -4844,7 +5001,55 @@
           <a:bodyPr/>
           <a:lstStyle/>
           <a:p>
-            <a:endParaRPr lang="en-US"/>
+            <a:r>
+              <a:rPr lang="en-US" dirty="0" smtClean="0"/>
+              <a:t>ISL12082, DS1307, PCF2127, M41T82/83, DS1337 these are the accurate RTC.</a:t>
+            </a:r>
+          </a:p>
+          <a:p>
+            <a:r>
+              <a:rPr lang="en-US" dirty="0" smtClean="0"/>
+              <a:t>Among them PCF2127 is the extremely accurate RTC</a:t>
+            </a:r>
+          </a:p>
+          <a:p>
+            <a:r>
+              <a:rPr lang="en-US" dirty="0" smtClean="0"/>
+              <a:t>Feasibility of communicating with the MCU</a:t>
+            </a:r>
+          </a:p>
+          <a:p>
+            <a:r>
+              <a:rPr lang="en-US" dirty="0" smtClean="0"/>
+              <a:t>Power consumption</a:t>
+            </a:r>
+          </a:p>
+          <a:p>
+            <a:r>
+              <a:rPr lang="en-US" dirty="0" smtClean="0"/>
+              <a:t>Temperature compensated</a:t>
+            </a:r>
+          </a:p>
+          <a:p>
+            <a:r>
+              <a:rPr lang="en-US" dirty="0" smtClean="0"/>
+              <a:t>Operating range</a:t>
+            </a:r>
+          </a:p>
+          <a:p>
+            <a:r>
+              <a:rPr lang="en-US" dirty="0" smtClean="0"/>
+              <a:t>I2C bus interface</a:t>
+            </a:r>
+          </a:p>
+          <a:p>
+            <a:r>
+              <a:rPr lang="en-US" dirty="0" smtClean="0"/>
+              <a:t>Programmable watchdog timer with interrupt</a:t>
+            </a:r>
+          </a:p>
+          <a:p>
+            <a:endParaRPr lang="en-US" dirty="0"/>
           </a:p>
         </p:txBody>
       </p:sp>
@@ -4890,7 +5095,7 @@
           <a:p>
             <a:r>
               <a:rPr lang="en-US" dirty="0" smtClean="0"/>
-              <a:t>Hardware- Button interface</a:t>
+              <a:t>Hardware- MCU and RTC</a:t>
             </a:r>
             <a:endParaRPr lang="en-US" dirty="0"/>
           </a:p>
@@ -4911,32 +5116,63 @@
           <a:bodyPr/>
           <a:lstStyle/>
           <a:p>
-            <a:endParaRPr lang="en-US" smtClean="0"/>
-          </a:p>
-          <a:p>
-            <a:r>
-              <a:rPr lang="en-US" smtClean="0"/>
-              <a:t>Must </a:t>
-            </a:r>
-            <a:r>
-              <a:rPr lang="en-US" dirty="0" smtClean="0"/>
-              <a:t>be able </a:t>
-            </a:r>
-            <a:r>
-              <a:rPr lang="en-US" dirty="0" smtClean="0"/>
-              <a:t>turn on and record with out manually pressing buttons</a:t>
-            </a:r>
-          </a:p>
-          <a:p>
-            <a:r>
-              <a:rPr lang="en-US" dirty="0" smtClean="0"/>
-              <a:t>Requires </a:t>
-            </a:r>
-            <a:r>
-              <a:rPr lang="en-US" dirty="0" smtClean="0"/>
-              <a:t>connection to send electrical signals as if button sequence is being pressed</a:t>
-            </a:r>
-            <a:endParaRPr lang="en-US" dirty="0"/>
+            <a:r>
+              <a:rPr lang="en-US" dirty="0" smtClean="0"/>
+              <a:t>8-bit PIC </a:t>
+            </a:r>
+            <a:r>
+              <a:rPr lang="en-US" dirty="0" err="1" smtClean="0"/>
+              <a:t>MCUs</a:t>
+            </a:r>
+            <a:r>
+              <a:rPr lang="en-US" dirty="0" smtClean="0"/>
+              <a:t>, ATmega328p, PIC24F16KA101 these are the extreme low power Microcontrollers.</a:t>
+            </a:r>
+          </a:p>
+          <a:p>
+            <a:r>
+              <a:rPr lang="en-US" dirty="0" smtClean="0"/>
+              <a:t>Among them 8-bit PIC MCU is the best.</a:t>
+            </a:r>
+          </a:p>
+          <a:p>
+            <a:r>
+              <a:rPr lang="en-US" dirty="0" smtClean="0"/>
+              <a:t>128KB Flash, 4KB RAM, Onboard EEPROM, </a:t>
+            </a:r>
+          </a:p>
+          <a:p>
+            <a:r>
+              <a:rPr lang="en-US" dirty="0" smtClean="0"/>
+              <a:t>I2C, SPI, UART, USB, Ethernet</a:t>
+            </a:r>
+          </a:p>
+          <a:p>
+            <a:r>
+              <a:rPr lang="en-US" dirty="0" smtClean="0"/>
+              <a:t>Operation down to 1.8V, sleep current as low as 20nA</a:t>
+            </a:r>
+          </a:p>
+          <a:p>
+            <a:r>
+              <a:rPr lang="en-US" dirty="0" smtClean="0"/>
+              <a:t>Special low power BOR, WDT, RTC</a:t>
+            </a:r>
+          </a:p>
+          <a:p>
+            <a:r>
+              <a:rPr lang="en-US" dirty="0" smtClean="0"/>
+              <a:t>Programmable Switch Mode Controller</a:t>
+            </a:r>
+          </a:p>
+          <a:p>
+            <a:r>
+              <a:rPr lang="en-US" smtClean="0"/>
+              <a:t>Industry’s most robust offering</a:t>
+            </a:r>
+          </a:p>
+          <a:p>
+            <a:endParaRPr lang="en-US"/>
           </a:p>
         </p:txBody>
       </p:sp>
@@ -4982,15 +5218,7 @@
           <a:p>
             <a:r>
               <a:rPr lang="en-US" dirty="0" smtClean="0"/>
-              <a:t>Hardware – </a:t>
-            </a:r>
-            <a:r>
-              <a:rPr lang="en-US" dirty="0" err="1" smtClean="0"/>
-              <a:t>MicroSD</a:t>
-            </a:r>
-            <a:r>
-              <a:rPr lang="en-US" dirty="0" smtClean="0"/>
-              <a:t> Storage</a:t>
+              <a:t>Hardware- Button interface</a:t>
             </a:r>
             <a:endParaRPr lang="en-US" dirty="0"/>
           </a:p>
@@ -5008,63 +5236,31 @@
         </p:nvSpPr>
         <p:spPr/>
         <p:txBody>
-          <a:bodyPr>
-            <a:normAutofit/>
-          </a:bodyPr>
-          <a:lstStyle/>
-          <a:p>
-            <a:r>
-              <a:rPr lang="en-US" dirty="0"/>
-              <a:t>2x Fairchild FSSD06 Multiplexer</a:t>
-            </a:r>
-          </a:p>
-          <a:p>
-            <a:r>
-              <a:rPr lang="en-US" dirty="0"/>
-              <a:t>Each MUX interfaces 2x micro SD cards </a:t>
-            </a:r>
-            <a:r>
-              <a:rPr lang="en-US" dirty="0" smtClean="0"/>
-              <a:t>each</a:t>
-            </a:r>
-          </a:p>
-          <a:p>
-            <a:r>
-              <a:rPr lang="en-US" dirty="0" smtClean="0"/>
-              <a:t>4 micro SD cards total, 128GB combined total storage</a:t>
+          <a:bodyPr/>
+          <a:lstStyle/>
+          <a:p>
+            <a:endParaRPr lang="en-US" smtClean="0"/>
+          </a:p>
+          <a:p>
+            <a:r>
+              <a:rPr lang="en-US" smtClean="0"/>
+              <a:t>Must </a:t>
+            </a:r>
+            <a:r>
+              <a:rPr lang="en-US" dirty="0" smtClean="0"/>
+              <a:t>be able turn on and record with out manually pressing buttons</a:t>
+            </a:r>
+          </a:p>
+          <a:p>
+            <a:r>
+              <a:rPr lang="en-US" dirty="0" smtClean="0"/>
+              <a:t>Requires connection to send electrical signals as if button sequence is being pressed</a:t>
             </a:r>
             <a:endParaRPr lang="en-US" dirty="0"/>
           </a:p>
-          <a:p>
-            <a:r>
-              <a:rPr lang="en-US" dirty="0"/>
-              <a:t>Each MUX input shares DAT bus connections from DSP on TASCAM</a:t>
-            </a:r>
-          </a:p>
-          <a:p>
-            <a:pPr lvl="1"/>
-            <a:r>
-              <a:rPr lang="en-US" dirty="0"/>
-              <a:t>Each has an Output Enable pin, when set high inputs have high impedance, no need for additional multiplexing of input signals.</a:t>
-            </a:r>
-          </a:p>
-          <a:p>
-            <a:r>
-              <a:rPr lang="en-US" dirty="0"/>
-              <a:t>Maximum power consumption for entire MUX system &lt;0.01 mA</a:t>
-            </a:r>
-          </a:p>
-          <a:p>
-            <a:endParaRPr lang="en-US" dirty="0"/>
-          </a:p>
         </p:txBody>
       </p:sp>
     </p:spTree>
-    <p:extLst>
-      <p:ext uri="{BB962C8B-B14F-4D97-AF65-F5344CB8AC3E}">
-        <p14:creationId xmlns:mc="http://schemas.openxmlformats.org/markup-compatibility/2006" xmlns:mv="urn:schemas-microsoft-com:mac:vml" xmlns:p14="http://schemas.microsoft.com/office/powerpoint/2010/main" xmlns:p="http://schemas.openxmlformats.org/presentationml/2006/main" xmlns:r="http://schemas.openxmlformats.org/officeDocument/2006/relationships" xmlns:a="http://schemas.openxmlformats.org/drawingml/2006/main" xmlns="" val="3782849377"/>
-      </p:ext>
-    </p:extLst>
   </p:cSld>
   <p:clrMapOvr>
     <a:masterClrMapping/>
@@ -5106,7 +5302,15 @@
           <a:p>
             <a:r>
               <a:rPr lang="en-US" dirty="0" smtClean="0"/>
-              <a:t>Software</a:t>
+              <a:t>Hardware – </a:t>
+            </a:r>
+            <a:r>
+              <a:rPr lang="en-US" dirty="0" err="1" smtClean="0"/>
+              <a:t>MicroSD</a:t>
+            </a:r>
+            <a:r>
+              <a:rPr lang="en-US" dirty="0" smtClean="0"/>
+              <a:t> Storage</a:t>
             </a:r>
             <a:endParaRPr lang="en-US" dirty="0"/>
           </a:p>
@@ -5124,42 +5328,63 @@
         </p:nvSpPr>
         <p:spPr/>
         <p:txBody>
-          <a:bodyPr/>
-          <a:lstStyle/>
-          <a:p>
-            <a:endParaRPr lang="en-US" dirty="0" smtClean="0"/>
-          </a:p>
-          <a:p>
-            <a:r>
-              <a:rPr lang="en-US" dirty="0" smtClean="0"/>
-              <a:t>Three major components of software</a:t>
+          <a:bodyPr>
+            <a:normAutofit/>
+          </a:bodyPr>
+          <a:lstStyle/>
+          <a:p>
+            <a:r>
+              <a:rPr lang="en-US" dirty="0"/>
+              <a:t>2x Fairchild FSSD06 Multiplexer</a:t>
+            </a:r>
+          </a:p>
+          <a:p>
+            <a:r>
+              <a:rPr lang="en-US" dirty="0"/>
+              <a:t>Each MUX interfaces 2x micro SD cards </a:t>
+            </a:r>
+            <a:r>
+              <a:rPr lang="en-US" dirty="0" smtClean="0"/>
+              <a:t>each</a:t>
+            </a:r>
+          </a:p>
+          <a:p>
+            <a:r>
+              <a:rPr lang="en-US" dirty="0" smtClean="0"/>
+              <a:t>4 micro SD cards total, 128GB combined total storage</a:t>
+            </a:r>
+            <a:endParaRPr lang="en-US" dirty="0"/>
+          </a:p>
+          <a:p>
+            <a:r>
+              <a:rPr lang="en-US" dirty="0"/>
+              <a:t>Each MUX input shares DAT bus connections from DSP on TASCAM</a:t>
             </a:r>
           </a:p>
           <a:p>
             <a:pPr lvl="1"/>
             <a:r>
-              <a:rPr lang="en-US" dirty="0" smtClean="0"/>
-              <a:t>Pre-Mission user interface</a:t>
-            </a:r>
-          </a:p>
-          <a:p>
-            <a:pPr lvl="1"/>
-            <a:r>
-              <a:rPr lang="en-US" dirty="0" smtClean="0"/>
-              <a:t>In-Mission recording schedule control</a:t>
-            </a:r>
-          </a:p>
-          <a:p>
-            <a:pPr lvl="1"/>
-            <a:r>
-              <a:rPr lang="en-US" dirty="0" smtClean="0"/>
-              <a:t>Post-Mission data analysis</a:t>
-            </a:r>
+              <a:rPr lang="en-US" dirty="0"/>
+              <a:t>Each has an Output Enable pin, when set high inputs have high impedance, no need for additional multiplexing of input signals.</a:t>
+            </a:r>
+          </a:p>
+          <a:p>
+            <a:r>
+              <a:rPr lang="en-US" dirty="0"/>
+              <a:t>Maximum power consumption for entire MUX system &lt;0.01 mA</a:t>
+            </a:r>
+          </a:p>
+          <a:p>
             <a:endParaRPr lang="en-US" dirty="0"/>
           </a:p>
         </p:txBody>
       </p:sp>
     </p:spTree>
+    <p:extLst>
+      <p:ext uri="{BB962C8B-B14F-4D97-AF65-F5344CB8AC3E}">
+        <p14:creationId xmlns="" xmlns:a="http://schemas.openxmlformats.org/drawingml/2006/main" xmlns:r="http://schemas.openxmlformats.org/officeDocument/2006/relationships" xmlns:p="http://schemas.openxmlformats.org/presentationml/2006/main" xmlns:p14="http://schemas.microsoft.com/office/powerpoint/2010/main" xmlns:mv="urn:schemas-microsoft-com:mac:vml" xmlns:mc="http://schemas.openxmlformats.org/markup-compatibility/2006" val="3782849377"/>
+      </p:ext>
+    </p:extLst>
   </p:cSld>
   <p:clrMapOvr>
     <a:masterClrMapping/>

</xml_diff>